<commit_message>
Habe bei den Pro und Cons des zweiten Tasks ergänzt/verändert/hinzugefügt.
</commit_message>
<xml_diff>
--- a/doc/task02/Task2.pptx
+++ b/doc/task02/Task2.pptx
@@ -1,6 +1,6 @@
 
 <file path=ppt/presentation.xml><?xml version="1.0" encoding="utf-8"?>
-<p:presentation xmlns:a="http://schemas.openxmlformats.org/drawingml/2006/main" xmlns:r="http://schemas.openxmlformats.org/officeDocument/2006/relationships" xmlns:p="http://schemas.openxmlformats.org/presentationml/2006/main" saveSubsetFonts="1">
+<p:presentation xmlns:a="http://schemas.openxmlformats.org/drawingml/2006/main" xmlns:r="http://schemas.openxmlformats.org/officeDocument/2006/relationships" xmlns:p="http://schemas.openxmlformats.org/presentationml/2006/main" serverZoom="49229" saveSubsetFonts="1">
   <p:sldMasterIdLst>
     <p:sldMasterId id="2147483648" r:id="rId1"/>
   </p:sldMasterIdLst>
@@ -3119,7 +3119,7 @@
         <p:spPr/>
         <p:txBody>
           <a:bodyPr>
-            <a:normAutofit fontScale="77500" lnSpcReduction="20000"/>
+            <a:normAutofit fontScale="55000" lnSpcReduction="20000"/>
           </a:bodyPr>
           <a:lstStyle/>
           <a:p>
@@ -3144,8 +3144,27 @@
             <a:pPr lvl="2"/>
             <a:r>
               <a:rPr lang="de-CH" dirty="0" smtClean="0"/>
-              <a:t>Klar definierte vorgegebene Zeit</a:t>
-            </a:r>
+              <a:t>Klar definierte vorgegebene </a:t>
+            </a:r>
+            <a:r>
+              <a:rPr lang="de-CH" dirty="0" smtClean="0"/>
+              <a:t>Zeit</a:t>
+            </a:r>
+          </a:p>
+          <a:p>
+            <a:pPr lvl="2"/>
+            <a:r>
+              <a:rPr lang="de-CH" dirty="0" smtClean="0"/>
+              <a:t>Einfache Arbeitsplanung</a:t>
+            </a:r>
+          </a:p>
+          <a:p>
+            <a:pPr lvl="2"/>
+            <a:r>
+              <a:rPr lang="de-CH" dirty="0" smtClean="0"/>
+              <a:t>Aufgaben gut aufteilbar</a:t>
+            </a:r>
+            <a:endParaRPr lang="de-CH" dirty="0" smtClean="0"/>
           </a:p>
           <a:p>
             <a:pPr lvl="1"/>
@@ -3161,12 +3180,28 @@
               <a:rPr lang="de-CH" dirty="0" smtClean="0"/>
               <a:t>Unflexibel </a:t>
             </a:r>
+            <a:r>
+              <a:rPr lang="de-CH" dirty="0" smtClean="0"/>
+              <a:t>(Änderungen sind schwierig umzusetzen)</a:t>
+            </a:r>
+            <a:endParaRPr lang="de-CH" dirty="0" smtClean="0"/>
           </a:p>
           <a:p>
             <a:pPr lvl="2"/>
             <a:r>
               <a:rPr lang="de-CH" dirty="0" smtClean="0"/>
-              <a:t>Unerwartete Probleme schwierig zu handeln</a:t>
+              <a:t>Unerwartete Probleme schwierig zu </a:t>
+            </a:r>
+            <a:r>
+              <a:rPr lang="de-CH" dirty="0" smtClean="0"/>
+              <a:t>handeln</a:t>
+            </a:r>
+          </a:p>
+          <a:p>
+            <a:pPr lvl="2"/>
+            <a:r>
+              <a:rPr lang="de-CH" dirty="0" smtClean="0"/>
+              <a:t>Wenn sich die Ziele ändern müssen wir alles vielleicht wieder alles von neu planen -&gt; sehr Zeitaufwändig </a:t>
             </a:r>
             <a:endParaRPr lang="de-CH" dirty="0" smtClean="0"/>
           </a:p>
@@ -3191,7 +3226,6 @@
               <a:rPr lang="de-CH" dirty="0" smtClean="0"/>
               <a:t>Agile</a:t>
             </a:r>
-            <a:endParaRPr lang="de-CH" dirty="0" smtClean="0"/>
           </a:p>
           <a:p>
             <a:pPr lvl="1"/>
@@ -3204,8 +3238,9 @@
             <a:pPr lvl="2"/>
             <a:r>
               <a:rPr lang="de-CH" dirty="0" smtClean="0"/>
-              <a:t>Ziele können sich ändern</a:t>
-            </a:r>
+              <a:t>Änderung der Ziele einfacher aufzufangen</a:t>
+            </a:r>
+            <a:endParaRPr lang="de-CH" dirty="0" smtClean="0"/>
           </a:p>
           <a:p>
             <a:pPr lvl="2"/>
@@ -3225,8 +3260,20 @@
             <a:pPr lvl="2"/>
             <a:r>
               <a:rPr lang="de-CH" dirty="0" smtClean="0"/>
-              <a:t>Zwischenresultate sichtbar (auch für User)</a:t>
-            </a:r>
+              <a:t>Zwischenresultate sichtbar (auch für User</a:t>
+            </a:r>
+            <a:r>
+              <a:rPr lang="de-CH" dirty="0" smtClean="0"/>
+              <a:t>)</a:t>
+            </a:r>
+          </a:p>
+          <a:p>
+            <a:pPr lvl="2"/>
+            <a:r>
+              <a:rPr lang="de-CH" dirty="0" smtClean="0"/>
+              <a:t>Man sieht ob man im Zeitplan steht und ob das «Kosten/Nutzen-Verhältnis» bis dahin stimmt</a:t>
+            </a:r>
+            <a:endParaRPr lang="de-CH" dirty="0" smtClean="0"/>
           </a:p>
           <a:p>
             <a:pPr lvl="1"/>
@@ -3242,7 +3289,6 @@
               <a:rPr lang="de-CH" dirty="0" smtClean="0"/>
               <a:t>Viele Meetings</a:t>
             </a:r>
-            <a:endParaRPr lang="de-CH" dirty="0" smtClean="0"/>
           </a:p>
           <a:p>
             <a:pPr marL="914400" lvl="2" indent="0">
@@ -3610,7 +3656,7 @@
   <a:extraClrSchemeLst/>
   <a:extLst>
     <a:ext uri="{05A4C25C-085E-4340-85A3-A5531E510DB2}">
-      <thm15:themeFamily xmlns:thm15="http://schemas.microsoft.com/office/thememl/2012/main" name="Office Theme" id="{62F939B6-93AF-4DB8-9C6B-D6C7DFDC589F}" vid="{4A3C46E8-61CC-4603-A589-7422A47A8E4A}"/>
+      <thm15:themeFamily xmlns:thm15="http://schemas.microsoft.com/office/thememl/2012/main" xmlns="" name="Office Theme" id="{62F939B6-93AF-4DB8-9C6B-D6C7DFDC589F}" vid="{4A3C46E8-61CC-4603-A589-7422A47A8E4A}"/>
     </a:ext>
   </a:extLst>
 </a:theme>

</xml_diff>

<commit_message>
- Aufzählung durch Tabelle ersetzt - Farben angepasst - Content
</commit_message>
<xml_diff>
--- a/doc/task02/Task2.pptx
+++ b/doc/task02/Task2.pptx
@@ -6,8 +6,9 @@
   </p:sldMasterIdLst>
   <p:sldIdLst>
     <p:sldId id="257" r:id="rId2"/>
-    <p:sldId id="258" r:id="rId3"/>
-    <p:sldId id="259" r:id="rId4"/>
+    <p:sldId id="260" r:id="rId3"/>
+    <p:sldId id="258" r:id="rId4"/>
+    <p:sldId id="259" r:id="rId5"/>
   </p:sldIdLst>
   <p:sldSz cx="12192000" cy="6858000"/>
   <p:notesSz cx="6858000" cy="9144000"/>
@@ -106,6 +107,22 @@
       </a:defRPr>
     </a:lvl9pPr>
   </p:defaultTextStyle>
+  <p:extLst>
+    <p:ext uri="{EFAFB233-063F-42B5-8137-9DF3F51BA10A}">
+      <p15:sldGuideLst xmlns:p15="http://schemas.microsoft.com/office/powerpoint/2012/main">
+        <p15:guide id="1" orient="horz" pos="2160">
+          <p15:clr>
+            <a:srgbClr val="A4A3A4"/>
+          </p15:clr>
+        </p15:guide>
+        <p15:guide id="2" pos="3840">
+          <p15:clr>
+            <a:srgbClr val="A4A3A4"/>
+          </p15:clr>
+        </p15:guide>
+      </p15:sldGuideLst>
+    </p:ext>
+  </p:extLst>
 </p:presentation>
 </file>
 
@@ -240,7 +257,7 @@
           <a:p>
             <a:fld id="{B815E98A-0D5B-4172-A8C9-1641F3C9D774}" type="datetimeFigureOut">
               <a:rPr lang="de-CH" smtClean="0"/>
-              <a:t>24.09.2015</a:t>
+              <a:t>25.09.2015</a:t>
             </a:fld>
             <a:endParaRPr lang="de-CH"/>
           </a:p>
@@ -410,7 +427,7 @@
           <a:p>
             <a:fld id="{B815E98A-0D5B-4172-A8C9-1641F3C9D774}" type="datetimeFigureOut">
               <a:rPr lang="de-CH" smtClean="0"/>
-              <a:t>24.09.2015</a:t>
+              <a:t>25.09.2015</a:t>
             </a:fld>
             <a:endParaRPr lang="de-CH"/>
           </a:p>
@@ -590,7 +607,7 @@
           <a:p>
             <a:fld id="{B815E98A-0D5B-4172-A8C9-1641F3C9D774}" type="datetimeFigureOut">
               <a:rPr lang="de-CH" smtClean="0"/>
-              <a:t>24.09.2015</a:t>
+              <a:t>25.09.2015</a:t>
             </a:fld>
             <a:endParaRPr lang="de-CH"/>
           </a:p>
@@ -760,7 +777,7 @@
           <a:p>
             <a:fld id="{B815E98A-0D5B-4172-A8C9-1641F3C9D774}" type="datetimeFigureOut">
               <a:rPr lang="de-CH" smtClean="0"/>
-              <a:t>24.09.2015</a:t>
+              <a:t>25.09.2015</a:t>
             </a:fld>
             <a:endParaRPr lang="de-CH"/>
           </a:p>
@@ -1006,7 +1023,7 @@
           <a:p>
             <a:fld id="{B815E98A-0D5B-4172-A8C9-1641F3C9D774}" type="datetimeFigureOut">
               <a:rPr lang="de-CH" smtClean="0"/>
-              <a:t>24.09.2015</a:t>
+              <a:t>25.09.2015</a:t>
             </a:fld>
             <a:endParaRPr lang="de-CH"/>
           </a:p>
@@ -1238,7 +1255,7 @@
           <a:p>
             <a:fld id="{B815E98A-0D5B-4172-A8C9-1641F3C9D774}" type="datetimeFigureOut">
               <a:rPr lang="de-CH" smtClean="0"/>
-              <a:t>24.09.2015</a:t>
+              <a:t>25.09.2015</a:t>
             </a:fld>
             <a:endParaRPr lang="de-CH"/>
           </a:p>
@@ -1605,7 +1622,7 @@
           <a:p>
             <a:fld id="{B815E98A-0D5B-4172-A8C9-1641F3C9D774}" type="datetimeFigureOut">
               <a:rPr lang="de-CH" smtClean="0"/>
-              <a:t>24.09.2015</a:t>
+              <a:t>25.09.2015</a:t>
             </a:fld>
             <a:endParaRPr lang="de-CH"/>
           </a:p>
@@ -1723,7 +1740,7 @@
           <a:p>
             <a:fld id="{B815E98A-0D5B-4172-A8C9-1641F3C9D774}" type="datetimeFigureOut">
               <a:rPr lang="de-CH" smtClean="0"/>
-              <a:t>24.09.2015</a:t>
+              <a:t>25.09.2015</a:t>
             </a:fld>
             <a:endParaRPr lang="de-CH"/>
           </a:p>
@@ -1818,7 +1835,7 @@
           <a:p>
             <a:fld id="{B815E98A-0D5B-4172-A8C9-1641F3C9D774}" type="datetimeFigureOut">
               <a:rPr lang="de-CH" smtClean="0"/>
-              <a:t>24.09.2015</a:t>
+              <a:t>25.09.2015</a:t>
             </a:fld>
             <a:endParaRPr lang="de-CH"/>
           </a:p>
@@ -2095,7 +2112,7 @@
           <a:p>
             <a:fld id="{B815E98A-0D5B-4172-A8C9-1641F3C9D774}" type="datetimeFigureOut">
               <a:rPr lang="de-CH" smtClean="0"/>
-              <a:t>24.09.2015</a:t>
+              <a:t>25.09.2015</a:t>
             </a:fld>
             <a:endParaRPr lang="de-CH"/>
           </a:p>
@@ -2348,7 +2365,7 @@
           <a:p>
             <a:fld id="{B815E98A-0D5B-4172-A8C9-1641F3C9D774}" type="datetimeFigureOut">
               <a:rPr lang="de-CH" smtClean="0"/>
-              <a:t>24.09.2015</a:t>
+              <a:t>25.09.2015</a:t>
             </a:fld>
             <a:endParaRPr lang="de-CH"/>
           </a:p>
@@ -2561,7 +2578,7 @@
           <a:p>
             <a:fld id="{B815E98A-0D5B-4172-A8C9-1641F3C9D774}" type="datetimeFigureOut">
               <a:rPr lang="de-CH" smtClean="0"/>
-              <a:t>24.09.2015</a:t>
+              <a:t>25.09.2015</a:t>
             </a:fld>
             <a:endParaRPr lang="de-CH"/>
           </a:p>
@@ -2978,11 +2995,13 @@
         </p:nvSpPr>
         <p:spPr/>
         <p:txBody>
-          <a:bodyPr/>
-          <a:lstStyle/>
-          <a:p>
-            <a:r>
-              <a:rPr lang="de-CH" b="1" dirty="0" smtClean="0">
+          <a:bodyPr>
+            <a:normAutofit/>
+          </a:bodyPr>
+          <a:lstStyle/>
+          <a:p>
+            <a:r>
+              <a:rPr lang="de-CH" sz="7200" b="1" dirty="0" smtClean="0">
                 <a:solidFill>
                   <a:srgbClr val="00B050"/>
                 </a:solidFill>
@@ -2996,7 +3015,7 @@
               </a:rPr>
               <a:t>Team Green</a:t>
             </a:r>
-            <a:endParaRPr lang="de-CH" b="1" dirty="0">
+            <a:endParaRPr lang="de-CH" sz="7200" b="1" dirty="0">
               <a:solidFill>
                 <a:srgbClr val="00B050"/>
               </a:solidFill>
@@ -3023,25 +3042,27 @@
         </p:nvSpPr>
         <p:spPr/>
         <p:txBody>
-          <a:bodyPr/>
-          <a:lstStyle/>
-          <a:p>
-            <a:r>
-              <a:rPr lang="de-CH" dirty="0" smtClean="0"/>
+          <a:bodyPr>
+            <a:normAutofit/>
+          </a:bodyPr>
+          <a:lstStyle/>
+          <a:p>
+            <a:r>
+              <a:rPr lang="de-CH" sz="3200" dirty="0" smtClean="0"/>
               <a:t>Task 2 – SE </a:t>
             </a:r>
             <a:r>
-              <a:rPr lang="de-CH" dirty="0" err="1" smtClean="0"/>
+              <a:rPr lang="de-CH" sz="3200" dirty="0" err="1" smtClean="0"/>
               <a:t>Process</a:t>
             </a:r>
-            <a:endParaRPr lang="de-CH" dirty="0" smtClean="0"/>
-          </a:p>
-          <a:p>
-            <a:r>
-              <a:rPr lang="de-CH" dirty="0" smtClean="0"/>
+            <a:endParaRPr lang="de-CH" sz="3200" dirty="0" smtClean="0"/>
+          </a:p>
+          <a:p>
+            <a:r>
+              <a:rPr lang="de-CH" sz="3200" dirty="0" smtClean="0"/>
               <a:t>Projekt MHC-PMS</a:t>
             </a:r>
-            <a:endParaRPr lang="de-CH" dirty="0"/>
+            <a:endParaRPr lang="de-CH" sz="3200" dirty="0"/>
           </a:p>
         </p:txBody>
       </p:sp>
@@ -3091,227 +3112,54 @@
           <a:lstStyle/>
           <a:p>
             <a:r>
+              <a:rPr lang="de-CH" b="1" dirty="0" smtClean="0">
+                <a:solidFill>
+                  <a:srgbClr val="00B050"/>
+                </a:solidFill>
+              </a:rPr>
+              <a:t>Content</a:t>
+            </a:r>
+            <a:endParaRPr lang="de-CH" dirty="0"/>
+          </a:p>
+        </p:txBody>
+      </p:sp>
+      <p:sp>
+        <p:nvSpPr>
+          <p:cNvPr id="3" name="Inhaltsplatzhalter 2"/>
+          <p:cNvSpPr>
+            <a:spLocks noGrp="1"/>
+          </p:cNvSpPr>
+          <p:nvPr>
+            <p:ph idx="1"/>
+          </p:nvPr>
+        </p:nvSpPr>
+        <p:spPr/>
+        <p:txBody>
+          <a:bodyPr/>
+          <a:lstStyle/>
+          <a:p>
+            <a:r>
               <a:rPr lang="de-CH" dirty="0" smtClean="0"/>
-              <a:t>1. Plan </a:t>
+              <a:t>Plan </a:t>
             </a:r>
             <a:r>
               <a:rPr lang="de-CH" dirty="0" err="1" smtClean="0"/>
-              <a:t>driven</a:t>
+              <a:t>Driven</a:t>
             </a:r>
             <a:r>
               <a:rPr lang="de-CH" dirty="0" smtClean="0"/>
               <a:t> vs. Agile</a:t>
             </a:r>
-            <a:endParaRPr lang="de-CH" dirty="0"/>
-          </a:p>
-        </p:txBody>
-      </p:sp>
-      <p:sp>
-        <p:nvSpPr>
-          <p:cNvPr id="3" name="Inhaltsplatzhalter 2"/>
-          <p:cNvSpPr>
-            <a:spLocks noGrp="1"/>
-          </p:cNvSpPr>
-          <p:nvPr>
-            <p:ph idx="1"/>
-          </p:nvPr>
-        </p:nvSpPr>
-        <p:spPr/>
-        <p:txBody>
-          <a:bodyPr>
-            <a:normAutofit fontScale="55000" lnSpcReduction="20000"/>
-          </a:bodyPr>
-          <a:lstStyle/>
-          <a:p>
+          </a:p>
+          <a:p>
+            <a:r>
+              <a:rPr lang="de-CH" dirty="0" err="1" smtClean="0"/>
+              <a:t>Process</a:t>
+            </a:r>
             <a:r>
               <a:rPr lang="de-CH" dirty="0" smtClean="0"/>
-              <a:t>Plan </a:t>
-            </a:r>
-            <a:r>
-              <a:rPr lang="de-CH" dirty="0" err="1" smtClean="0"/>
-              <a:t>driven</a:t>
-            </a:r>
-            <a:endParaRPr lang="de-CH" dirty="0" smtClean="0"/>
-          </a:p>
-          <a:p>
-            <a:pPr lvl="1"/>
-            <a:r>
-              <a:rPr lang="de-CH" dirty="0" smtClean="0"/>
-              <a:t>Pro</a:t>
-            </a:r>
-          </a:p>
-          <a:p>
-            <a:pPr lvl="2"/>
-            <a:r>
-              <a:rPr lang="de-CH" dirty="0" smtClean="0"/>
-              <a:t>Klar definierte vorgegebene </a:t>
-            </a:r>
-            <a:r>
-              <a:rPr lang="de-CH" dirty="0" smtClean="0"/>
-              <a:t>Zeit</a:t>
-            </a:r>
-          </a:p>
-          <a:p>
-            <a:pPr lvl="2"/>
-            <a:r>
-              <a:rPr lang="de-CH" dirty="0" smtClean="0"/>
-              <a:t>Einfache Arbeitsplanung</a:t>
-            </a:r>
-          </a:p>
-          <a:p>
-            <a:pPr lvl="2"/>
-            <a:r>
-              <a:rPr lang="de-CH" dirty="0" smtClean="0"/>
-              <a:t>Aufgaben gut aufteilbar</a:t>
-            </a:r>
-            <a:endParaRPr lang="de-CH" dirty="0" smtClean="0"/>
-          </a:p>
-          <a:p>
-            <a:pPr lvl="1"/>
-            <a:r>
-              <a:rPr lang="de-CH" dirty="0" err="1" smtClean="0"/>
-              <a:t>Con</a:t>
-            </a:r>
-            <a:endParaRPr lang="de-CH" dirty="0" smtClean="0"/>
-          </a:p>
-          <a:p>
-            <a:pPr lvl="2"/>
-            <a:r>
-              <a:rPr lang="de-CH" dirty="0" smtClean="0"/>
-              <a:t>Unflexibel </a:t>
-            </a:r>
-            <a:r>
-              <a:rPr lang="de-CH" dirty="0" smtClean="0"/>
-              <a:t>(Änderungen sind schwierig umzusetzen)</a:t>
-            </a:r>
-            <a:endParaRPr lang="de-CH" dirty="0" smtClean="0"/>
-          </a:p>
-          <a:p>
-            <a:pPr lvl="2"/>
-            <a:r>
-              <a:rPr lang="de-CH" dirty="0" smtClean="0"/>
-              <a:t>Unerwartete Probleme schwierig zu </a:t>
-            </a:r>
-            <a:r>
-              <a:rPr lang="de-CH" dirty="0" smtClean="0"/>
-              <a:t>handeln</a:t>
-            </a:r>
-          </a:p>
-          <a:p>
-            <a:pPr lvl="2"/>
-            <a:r>
-              <a:rPr lang="de-CH" dirty="0" smtClean="0"/>
-              <a:t>Wenn sich die Ziele ändern müssen wir alles vielleicht wieder alles von neu planen -&gt; sehr Zeitaufwändig </a:t>
-            </a:r>
-            <a:endParaRPr lang="de-CH" dirty="0" smtClean="0"/>
-          </a:p>
-          <a:p>
-            <a:pPr marL="914400" lvl="2" indent="0">
-              <a:buNone/>
-            </a:pPr>
-            <a:endParaRPr lang="de-CH" dirty="0" smtClean="0"/>
-          </a:p>
-          <a:p>
-            <a:pPr marL="914400" lvl="2" indent="0">
-              <a:buNone/>
-            </a:pPr>
-            <a:endParaRPr lang="de-CH" dirty="0" smtClean="0"/>
-          </a:p>
-          <a:p>
-            <a:pPr lvl="2"/>
-            <a:endParaRPr lang="de-CH" dirty="0"/>
-          </a:p>
-          <a:p>
-            <a:r>
-              <a:rPr lang="de-CH" dirty="0" smtClean="0"/>
-              <a:t>Agile</a:t>
-            </a:r>
-          </a:p>
-          <a:p>
-            <a:pPr lvl="1"/>
-            <a:r>
-              <a:rPr lang="de-CH" dirty="0" smtClean="0"/>
-              <a:t>Pro</a:t>
-            </a:r>
-          </a:p>
-          <a:p>
-            <a:pPr lvl="2"/>
-            <a:r>
-              <a:rPr lang="de-CH" dirty="0" smtClean="0"/>
-              <a:t>Änderung der Ziele einfacher aufzufangen</a:t>
-            </a:r>
-            <a:endParaRPr lang="de-CH" dirty="0" smtClean="0"/>
-          </a:p>
-          <a:p>
-            <a:pPr lvl="2"/>
-            <a:r>
-              <a:rPr lang="de-CH" dirty="0" smtClean="0"/>
-              <a:t>Gute Reaktion auf Veränderungen</a:t>
-            </a:r>
-          </a:p>
-          <a:p>
-            <a:pPr lvl="2"/>
-            <a:r>
-              <a:rPr lang="de-CH" dirty="0" smtClean="0"/>
-              <a:t>Fokus auf einzelne Tasks</a:t>
-            </a:r>
-          </a:p>
-          <a:p>
-            <a:pPr lvl="2"/>
-            <a:r>
-              <a:rPr lang="de-CH" dirty="0" smtClean="0"/>
-              <a:t>Zwischenresultate sichtbar (auch für User</a:t>
-            </a:r>
-            <a:r>
-              <a:rPr lang="de-CH" dirty="0" smtClean="0"/>
-              <a:t>)</a:t>
-            </a:r>
-          </a:p>
-          <a:p>
-            <a:pPr lvl="2"/>
-            <a:r>
-              <a:rPr lang="de-CH" dirty="0" smtClean="0"/>
-              <a:t>Man sieht ob man im Zeitplan steht und ob das «Kosten/Nutzen-Verhältnis» bis dahin stimmt</a:t>
-            </a:r>
-            <a:endParaRPr lang="de-CH" dirty="0" smtClean="0"/>
-          </a:p>
-          <a:p>
-            <a:pPr lvl="1"/>
-            <a:r>
-              <a:rPr lang="de-CH" dirty="0" err="1" smtClean="0"/>
-              <a:t>Con</a:t>
-            </a:r>
-            <a:endParaRPr lang="de-CH" dirty="0" smtClean="0"/>
-          </a:p>
-          <a:p>
-            <a:pPr lvl="2"/>
-            <a:r>
-              <a:rPr lang="de-CH" dirty="0" smtClean="0"/>
-              <a:t>Viele Meetings</a:t>
-            </a:r>
-          </a:p>
-          <a:p>
-            <a:pPr marL="914400" lvl="2" indent="0">
-              <a:buNone/>
-            </a:pPr>
-            <a:endParaRPr lang="de-CH" dirty="0" smtClean="0"/>
-          </a:p>
-          <a:p>
-            <a:pPr marL="914400" lvl="2" indent="0">
-              <a:buNone/>
-            </a:pPr>
-            <a:endParaRPr lang="de-CH" dirty="0" smtClean="0"/>
-          </a:p>
-          <a:p>
-            <a:pPr marL="914400" lvl="2" indent="0">
-              <a:buNone/>
-            </a:pPr>
-            <a:endParaRPr lang="de-CH" dirty="0" smtClean="0"/>
-          </a:p>
-          <a:p>
-            <a:pPr marL="914400" lvl="2" indent="0">
-              <a:buNone/>
-            </a:pPr>
+              <a:t> Modell</a:t>
+            </a:r>
             <a:endParaRPr lang="de-CH" dirty="0"/>
           </a:p>
         </p:txBody>
@@ -3319,7 +3167,7 @@
     </p:spTree>
     <p:extLst>
       <p:ext uri="{BB962C8B-B14F-4D97-AF65-F5344CB8AC3E}">
-        <p14:creationId xmlns:p14="http://schemas.microsoft.com/office/powerpoint/2010/main" val="4118920468"/>
+        <p14:creationId xmlns:p14="http://schemas.microsoft.com/office/powerpoint/2010/main" val="627735663"/>
       </p:ext>
     </p:extLst>
   </p:cSld>
@@ -3362,36 +3210,456 @@
           <a:lstStyle/>
           <a:p>
             <a:r>
-              <a:rPr lang="de-CH" dirty="0" smtClean="0"/>
-              <a:t>2. </a:t>
-            </a:r>
-            <a:endParaRPr lang="de-CH" dirty="0"/>
-          </a:p>
-        </p:txBody>
-      </p:sp>
-      <p:sp>
-        <p:nvSpPr>
-          <p:cNvPr id="3" name="Inhaltsplatzhalter 2"/>
-          <p:cNvSpPr>
-            <a:spLocks noGrp="1"/>
-          </p:cNvSpPr>
-          <p:nvPr>
-            <p:ph idx="1"/>
-          </p:nvPr>
-        </p:nvSpPr>
-        <p:spPr/>
-        <p:txBody>
-          <a:bodyPr/>
-          <a:lstStyle/>
-          <a:p>
-            <a:endParaRPr lang="de-CH"/>
-          </a:p>
-        </p:txBody>
-      </p:sp>
+              <a:rPr lang="de-CH" b="1" dirty="0" smtClean="0">
+                <a:solidFill>
+                  <a:srgbClr val="00B050"/>
+                </a:solidFill>
+              </a:rPr>
+              <a:t>1. Plan </a:t>
+            </a:r>
+            <a:r>
+              <a:rPr lang="de-CH" b="1" dirty="0" err="1" smtClean="0">
+                <a:solidFill>
+                  <a:srgbClr val="00B050"/>
+                </a:solidFill>
+              </a:rPr>
+              <a:t>driven</a:t>
+            </a:r>
+            <a:r>
+              <a:rPr lang="de-CH" b="1" dirty="0" smtClean="0">
+                <a:solidFill>
+                  <a:srgbClr val="00B050"/>
+                </a:solidFill>
+              </a:rPr>
+              <a:t> vs. Agile</a:t>
+            </a:r>
+            <a:endParaRPr lang="de-CH" b="1" dirty="0">
+              <a:solidFill>
+                <a:srgbClr val="00B050"/>
+              </a:solidFill>
+            </a:endParaRPr>
+          </a:p>
+        </p:txBody>
+      </p:sp>
+      <p:graphicFrame>
+        <p:nvGraphicFramePr>
+          <p:cNvPr id="4" name="Tabelle 3"/>
+          <p:cNvGraphicFramePr>
+            <a:graphicFrameLocks noGrp="1"/>
+          </p:cNvGraphicFramePr>
+          <p:nvPr>
+            <p:extLst>
+              <p:ext uri="{D42A27DB-BD31-4B8C-83A1-F6EECF244321}">
+                <p14:modId xmlns:p14="http://schemas.microsoft.com/office/powerpoint/2010/main" val="2249968674"/>
+              </p:ext>
+            </p:extLst>
+          </p:nvPr>
+        </p:nvGraphicFramePr>
+        <p:xfrm>
+          <a:off x="838200" y="1481070"/>
+          <a:ext cx="11152031" cy="5213893"/>
+        </p:xfrm>
+        <a:graphic>
+          <a:graphicData uri="http://schemas.openxmlformats.org/drawingml/2006/table">
+            <a:tbl>
+              <a:tblPr firstRow="1" bandRow="1">
+                <a:tableStyleId>{5C22544A-7EE6-4342-B048-85BDC9FD1C3A}</a:tableStyleId>
+              </a:tblPr>
+              <a:tblGrid>
+                <a:gridCol w="3558249"/>
+                <a:gridCol w="3796891"/>
+                <a:gridCol w="3796891"/>
+              </a:tblGrid>
+              <a:tr h="385412">
+                <a:tc>
+                  <a:txBody>
+                    <a:bodyPr/>
+                    <a:lstStyle/>
+                    <a:p>
+                      <a:r>
+                        <a:rPr lang="de-CH" sz="2000" dirty="0" err="1" smtClean="0"/>
+                        <a:t>Process</a:t>
+                      </a:r>
+                      <a:endParaRPr lang="de-CH" sz="2000" dirty="0"/>
+                    </a:p>
+                  </a:txBody>
+                  <a:tcPr>
+                    <a:solidFill>
+                      <a:srgbClr val="00B050"/>
+                    </a:solidFill>
+                  </a:tcPr>
+                </a:tc>
+                <a:tc>
+                  <a:txBody>
+                    <a:bodyPr/>
+                    <a:lstStyle/>
+                    <a:p>
+                      <a:r>
+                        <a:rPr lang="de-CH" sz="2000" dirty="0" smtClean="0"/>
+                        <a:t>Pro</a:t>
+                      </a:r>
+                      <a:endParaRPr lang="de-CH" sz="2000" dirty="0"/>
+                    </a:p>
+                  </a:txBody>
+                  <a:tcPr>
+                    <a:solidFill>
+                      <a:srgbClr val="00B050"/>
+                    </a:solidFill>
+                  </a:tcPr>
+                </a:tc>
+                <a:tc>
+                  <a:txBody>
+                    <a:bodyPr/>
+                    <a:lstStyle/>
+                    <a:p>
+                      <a:r>
+                        <a:rPr lang="de-CH" sz="2000" dirty="0" smtClean="0"/>
+                        <a:t>Contra</a:t>
+                      </a:r>
+                      <a:endParaRPr lang="de-CH" sz="2000" dirty="0"/>
+                    </a:p>
+                  </a:txBody>
+                  <a:tcPr>
+                    <a:solidFill>
+                      <a:srgbClr val="00B050"/>
+                    </a:solidFill>
+                  </a:tcPr>
+                </a:tc>
+              </a:tr>
+              <a:tr h="2119768">
+                <a:tc>
+                  <a:txBody>
+                    <a:bodyPr/>
+                    <a:lstStyle/>
+                    <a:p>
+                      <a:r>
+                        <a:rPr lang="de-CH" dirty="0" smtClean="0"/>
+                        <a:t>Plan </a:t>
+                      </a:r>
+                      <a:r>
+                        <a:rPr lang="de-CH" dirty="0" err="1" smtClean="0"/>
+                        <a:t>Driven</a:t>
+                      </a:r>
+                      <a:endParaRPr lang="de-CH" dirty="0"/>
+                    </a:p>
+                  </a:txBody>
+                  <a:tcPr>
+                    <a:solidFill>
+                      <a:srgbClr val="99FF66"/>
+                    </a:solidFill>
+                  </a:tcPr>
+                </a:tc>
+                <a:tc>
+                  <a:txBody>
+                    <a:bodyPr/>
+                    <a:lstStyle/>
+                    <a:p>
+                      <a:pPr marL="285750" indent="-285750">
+                        <a:buFont typeface="Arial" panose="020B0604020202020204" pitchFamily="34" charset="0"/>
+                        <a:buChar char="•"/>
+                      </a:pPr>
+                      <a:r>
+                        <a:rPr lang="de-CH" dirty="0" smtClean="0"/>
+                        <a:t>Klar definierte vorgegebene Zeit</a:t>
+                      </a:r>
+                    </a:p>
+                    <a:p>
+                      <a:pPr marL="285750" indent="-285750">
+                        <a:buFont typeface="Arial" panose="020B0604020202020204" pitchFamily="34" charset="0"/>
+                        <a:buChar char="•"/>
+                      </a:pPr>
+                      <a:r>
+                        <a:rPr lang="de-CH" dirty="0" smtClean="0"/>
+                        <a:t>Einfache Arbeitsplanung</a:t>
+                      </a:r>
+                    </a:p>
+                    <a:p>
+                      <a:pPr marL="285750" indent="-285750">
+                        <a:buFont typeface="Arial" panose="020B0604020202020204" pitchFamily="34" charset="0"/>
+                        <a:buChar char="•"/>
+                      </a:pPr>
+                      <a:r>
+                        <a:rPr lang="de-CH" dirty="0" smtClean="0"/>
+                        <a:t>Aufgaben gut aufteilbar</a:t>
+                      </a:r>
+                      <a:endParaRPr lang="de-CH" dirty="0"/>
+                    </a:p>
+                  </a:txBody>
+                  <a:tcPr>
+                    <a:solidFill>
+                      <a:srgbClr val="99FF66"/>
+                    </a:solidFill>
+                  </a:tcPr>
+                </a:tc>
+                <a:tc>
+                  <a:txBody>
+                    <a:bodyPr/>
+                    <a:lstStyle/>
+                    <a:p>
+                      <a:pPr marL="285750" indent="-285750">
+                        <a:buFont typeface="Arial" panose="020B0604020202020204" pitchFamily="34" charset="0"/>
+                        <a:buChar char="•"/>
+                      </a:pPr>
+                      <a:r>
+                        <a:rPr lang="de-CH" dirty="0" smtClean="0"/>
+                        <a:t>Unflexibel</a:t>
+                      </a:r>
+                      <a:r>
+                        <a:rPr lang="de-CH" baseline="0" dirty="0" smtClean="0"/>
+                        <a:t> (Änderungen sind schwierig umzusetzen</a:t>
+                      </a:r>
+                    </a:p>
+                    <a:p>
+                      <a:pPr marL="285750" indent="-285750">
+                        <a:buFont typeface="Arial" panose="020B0604020202020204" pitchFamily="34" charset="0"/>
+                        <a:buChar char="•"/>
+                      </a:pPr>
+                      <a:r>
+                        <a:rPr lang="de-CH" baseline="0" dirty="0" smtClean="0"/>
+                        <a:t>Unerwartete Probleme schwierig zu handeln</a:t>
+                      </a:r>
+                    </a:p>
+                    <a:p>
+                      <a:pPr marL="285750" indent="-285750">
+                        <a:buFont typeface="Arial" panose="020B0604020202020204" pitchFamily="34" charset="0"/>
+                        <a:buChar char="•"/>
+                      </a:pPr>
+                      <a:r>
+                        <a:rPr lang="de-CH" baseline="0" dirty="0" smtClean="0"/>
+                        <a:t>Ändern sich Ziele muss Planung komplett neu gemacht werden </a:t>
+                      </a:r>
+                      <a:r>
+                        <a:rPr lang="de-CH" baseline="0" dirty="0" smtClean="0">
+                          <a:sym typeface="Wingdings" panose="05000000000000000000" pitchFamily="2" charset="2"/>
+                        </a:rPr>
+                        <a:t> Zeitaufwand</a:t>
+                      </a:r>
+                      <a:endParaRPr lang="de-CH" dirty="0"/>
+                    </a:p>
+                  </a:txBody>
+                  <a:tcPr>
+                    <a:solidFill>
+                      <a:srgbClr val="99FF66"/>
+                    </a:solidFill>
+                  </a:tcPr>
+                </a:tc>
+              </a:tr>
+              <a:tr h="2697885">
+                <a:tc>
+                  <a:txBody>
+                    <a:bodyPr/>
+                    <a:lstStyle/>
+                    <a:p>
+                      <a:r>
+                        <a:rPr lang="de-CH" dirty="0" smtClean="0"/>
+                        <a:t>Agile</a:t>
+                      </a:r>
+                      <a:endParaRPr lang="de-CH" dirty="0"/>
+                    </a:p>
+                  </a:txBody>
+                  <a:tcPr>
+                    <a:solidFill>
+                      <a:srgbClr val="CCFF99"/>
+                    </a:solidFill>
+                  </a:tcPr>
+                </a:tc>
+                <a:tc>
+                  <a:txBody>
+                    <a:bodyPr/>
+                    <a:lstStyle/>
+                    <a:p>
+                      <a:pPr marL="285750" indent="-285750">
+                        <a:buFont typeface="Arial" panose="020B0604020202020204" pitchFamily="34" charset="0"/>
+                        <a:buChar char="•"/>
+                      </a:pPr>
+                      <a:r>
+                        <a:rPr lang="de-CH" dirty="0" err="1" smtClean="0"/>
+                        <a:t>Änderungeng</a:t>
+                      </a:r>
+                      <a:r>
+                        <a:rPr lang="de-CH" baseline="0" dirty="0" smtClean="0"/>
+                        <a:t> der Ziele einfacher aufzufangen</a:t>
+                      </a:r>
+                    </a:p>
+                    <a:p>
+                      <a:pPr marL="285750" indent="-285750">
+                        <a:buFont typeface="Arial" panose="020B0604020202020204" pitchFamily="34" charset="0"/>
+                        <a:buChar char="•"/>
+                      </a:pPr>
+                      <a:r>
+                        <a:rPr lang="de-CH" baseline="0" dirty="0" smtClean="0"/>
+                        <a:t>Gute Reaktion auf Veränderungen</a:t>
+                      </a:r>
+                    </a:p>
+                    <a:p>
+                      <a:pPr marL="285750" indent="-285750">
+                        <a:buFont typeface="Arial" panose="020B0604020202020204" pitchFamily="34" charset="0"/>
+                        <a:buChar char="•"/>
+                      </a:pPr>
+                      <a:r>
+                        <a:rPr lang="de-CH" baseline="0" dirty="0" smtClean="0"/>
+                        <a:t>Fokus auf einzelne Tasks</a:t>
+                      </a:r>
+                    </a:p>
+                    <a:p>
+                      <a:pPr marL="285750" indent="-285750">
+                        <a:buFont typeface="Arial" panose="020B0604020202020204" pitchFamily="34" charset="0"/>
+                        <a:buChar char="•"/>
+                      </a:pPr>
+                      <a:r>
+                        <a:rPr lang="de-CH" baseline="0" dirty="0" smtClean="0"/>
+                        <a:t>Zwischenresultate sichtbar (auch für User)</a:t>
+                      </a:r>
+                    </a:p>
+                    <a:p>
+                      <a:pPr marL="285750" indent="-285750">
+                        <a:buFont typeface="Arial" panose="020B0604020202020204" pitchFamily="34" charset="0"/>
+                        <a:buChar char="•"/>
+                      </a:pPr>
+                      <a:r>
+                        <a:rPr lang="de-CH" baseline="0" dirty="0" smtClean="0"/>
+                        <a:t>Immer ersichtlich ob man im Zeitplan ist und ob Kosten/Nutzen Verhältnis stimmt</a:t>
+                      </a:r>
+                      <a:endParaRPr lang="de-CH" dirty="0"/>
+                    </a:p>
+                  </a:txBody>
+                  <a:tcPr>
+                    <a:solidFill>
+                      <a:srgbClr val="CCFF99"/>
+                    </a:solidFill>
+                  </a:tcPr>
+                </a:tc>
+                <a:tc>
+                  <a:txBody>
+                    <a:bodyPr/>
+                    <a:lstStyle/>
+                    <a:p>
+                      <a:pPr marL="285750" indent="-285750">
+                        <a:buFont typeface="Arial" panose="020B0604020202020204" pitchFamily="34" charset="0"/>
+                        <a:buChar char="•"/>
+                      </a:pPr>
+                      <a:r>
+                        <a:rPr lang="de-CH" baseline="0" dirty="0" smtClean="0"/>
+                        <a:t>Viele Meetings</a:t>
+                      </a:r>
+                      <a:endParaRPr lang="de-CH" dirty="0"/>
+                    </a:p>
+                  </a:txBody>
+                  <a:tcPr>
+                    <a:solidFill>
+                      <a:srgbClr val="CCFF99"/>
+                    </a:solidFill>
+                  </a:tcPr>
+                </a:tc>
+              </a:tr>
+            </a:tbl>
+          </a:graphicData>
+        </a:graphic>
+      </p:graphicFrame>
     </p:spTree>
     <p:extLst>
       <p:ext uri="{BB962C8B-B14F-4D97-AF65-F5344CB8AC3E}">
-        <p14:creationId xmlns:p14="http://schemas.microsoft.com/office/powerpoint/2010/main" val="4293814750"/>
+        <p14:creationId xmlns:p14="http://schemas.microsoft.com/office/powerpoint/2010/main" val="4118920468"/>
+      </p:ext>
+    </p:extLst>
+  </p:cSld>
+  <p:clrMapOvr>
+    <a:masterClrMapping/>
+  </p:clrMapOvr>
+</p:sld>
+</file>
+
+<file path=ppt/slides/slide4.xml><?xml version="1.0" encoding="utf-8"?>
+<p:sld xmlns:a="http://schemas.openxmlformats.org/drawingml/2006/main" xmlns:r="http://schemas.openxmlformats.org/officeDocument/2006/relationships" xmlns:p="http://schemas.openxmlformats.org/presentationml/2006/main">
+  <p:cSld>
+    <p:spTree>
+      <p:nvGrpSpPr>
+        <p:cNvPr id="1" name=""/>
+        <p:cNvGrpSpPr/>
+        <p:nvPr/>
+      </p:nvGrpSpPr>
+      <p:grpSpPr>
+        <a:xfrm>
+          <a:off x="0" y="0"/>
+          <a:ext cx="0" cy="0"/>
+          <a:chOff x="0" y="0"/>
+          <a:chExt cx="0" cy="0"/>
+        </a:xfrm>
+      </p:grpSpPr>
+      <p:sp>
+        <p:nvSpPr>
+          <p:cNvPr id="2" name="Titel 1"/>
+          <p:cNvSpPr>
+            <a:spLocks noGrp="1"/>
+          </p:cNvSpPr>
+          <p:nvPr>
+            <p:ph type="title"/>
+          </p:nvPr>
+        </p:nvSpPr>
+        <p:spPr/>
+        <p:txBody>
+          <a:bodyPr/>
+          <a:lstStyle/>
+          <a:p>
+            <a:r>
+              <a:rPr lang="de-CH" b="1" dirty="0" smtClean="0">
+                <a:solidFill>
+                  <a:srgbClr val="00B050"/>
+                </a:solidFill>
+              </a:rPr>
+              <a:t>2. </a:t>
+            </a:r>
+            <a:r>
+              <a:rPr lang="de-CH" b="1" dirty="0" err="1" smtClean="0">
+                <a:solidFill>
+                  <a:srgbClr val="00B050"/>
+                </a:solidFill>
+              </a:rPr>
+              <a:t>Process</a:t>
+            </a:r>
+            <a:r>
+              <a:rPr lang="de-CH" b="1" dirty="0" smtClean="0">
+                <a:solidFill>
+                  <a:srgbClr val="00B050"/>
+                </a:solidFill>
+              </a:rPr>
+              <a:t> </a:t>
+            </a:r>
+            <a:r>
+              <a:rPr lang="de-CH" b="1" dirty="0" smtClean="0">
+                <a:solidFill>
+                  <a:srgbClr val="00B050"/>
+                </a:solidFill>
+              </a:rPr>
+              <a:t>Modell</a:t>
+            </a:r>
+            <a:endParaRPr lang="de-CH" dirty="0"/>
+          </a:p>
+        </p:txBody>
+      </p:sp>
+      <p:sp>
+        <p:nvSpPr>
+          <p:cNvPr id="3" name="Inhaltsplatzhalter 2"/>
+          <p:cNvSpPr>
+            <a:spLocks noGrp="1"/>
+          </p:cNvSpPr>
+          <p:nvPr>
+            <p:ph idx="1"/>
+          </p:nvPr>
+        </p:nvSpPr>
+        <p:spPr/>
+        <p:txBody>
+          <a:bodyPr/>
+          <a:lstStyle/>
+          <a:p>
+            <a:endParaRPr lang="de-CH" dirty="0"/>
+          </a:p>
+        </p:txBody>
+      </p:sp>
+    </p:spTree>
+    <p:extLst>
+      <p:ext uri="{BB962C8B-B14F-4D97-AF65-F5344CB8AC3E}">
+        <p14:creationId xmlns:p14="http://schemas.microsoft.com/office/powerpoint/2010/main" val="4073794779"/>
       </p:ext>
     </p:extLst>
   </p:cSld>
@@ -3656,7 +3924,7 @@
   <a:extraClrSchemeLst/>
   <a:extLst>
     <a:ext uri="{05A4C25C-085E-4340-85A3-A5531E510DB2}">
-      <thm15:themeFamily xmlns:thm15="http://schemas.microsoft.com/office/thememl/2012/main" xmlns="" name="Office Theme" id="{62F939B6-93AF-4DB8-9C6B-D6C7DFDC589F}" vid="{4A3C46E8-61CC-4603-A589-7422A47A8E4A}"/>
+      <thm15:themeFamily xmlns:thm15="http://schemas.microsoft.com/office/thememl/2012/main" name="Office Theme" id="{62F939B6-93AF-4DB8-9C6B-D6C7DFDC589F}" vid="{4A3C46E8-61CC-4603-A589-7422A47A8E4A}"/>
     </a:ext>
   </a:extLst>
 </a:theme>

</xml_diff>

<commit_message>
Process Modell um Tabelle erweitert
</commit_message>
<xml_diff>
--- a/doc/task02/Task2.pptx
+++ b/doc/task02/Task2.pptx
@@ -9,6 +9,7 @@
     <p:sldId id="260" r:id="rId3"/>
     <p:sldId id="258" r:id="rId4"/>
     <p:sldId id="259" r:id="rId5"/>
+    <p:sldId id="261" r:id="rId6"/>
   </p:sldIdLst>
   <p:sldSz cx="12192000" cy="6858000"/>
   <p:notesSz cx="6858000" cy="9144000"/>
@@ -3174,6 +3175,13 @@
   <p:clrMapOvr>
     <a:masterClrMapping/>
   </p:clrMapOvr>
+  <p:timing>
+    <p:tnLst>
+      <p:par>
+        <p:cTn id="1" dur="indefinite" restart="never" nodeType="tmRoot"/>
+      </p:par>
+    </p:tnLst>
+  </p:timing>
 </p:sld>
 </file>
 
@@ -3250,7 +3258,7 @@
           <p:nvPr>
             <p:extLst>
               <p:ext uri="{D42A27DB-BD31-4B8C-83A1-F6EECF244321}">
-                <p14:modId xmlns:p14="http://schemas.microsoft.com/office/powerpoint/2010/main" val="2249968674"/>
+                <p14:modId xmlns:p14="http://schemas.microsoft.com/office/powerpoint/2010/main" val="3797818906"/>
               </p:ext>
             </p:extLst>
           </p:nvPr>
@@ -3473,12 +3481,16 @@
                         <a:buChar char="•"/>
                       </a:pPr>
                       <a:r>
-                        <a:rPr lang="de-CH" dirty="0" err="1" smtClean="0"/>
-                        <a:t>Änderungeng</a:t>
+                        <a:rPr lang="de-CH" dirty="0" smtClean="0"/>
+                        <a:t>Änderungen</a:t>
                       </a:r>
                       <a:r>
                         <a:rPr lang="de-CH" baseline="0" dirty="0" smtClean="0"/>
-                        <a:t> der Ziele einfacher aufzufangen</a:t>
+                        <a:t> </a:t>
+                      </a:r>
+                      <a:r>
+                        <a:rPr lang="de-CH" baseline="0" dirty="0" smtClean="0"/>
+                        <a:t>der Ziele einfacher aufzufangen</a:t>
                       </a:r>
                     </a:p>
                     <a:p>
@@ -3566,6 +3578,13 @@
   <p:clrMapOvr>
     <a:masterClrMapping/>
   </p:clrMapOvr>
+  <p:timing>
+    <p:tnLst>
+      <p:par>
+        <p:cTn id="1" dur="indefinite" restart="never" nodeType="tmRoot"/>
+      </p:par>
+    </p:tnLst>
+  </p:timing>
 </p:sld>
 </file>
 
@@ -3623,43 +3642,862 @@
                   <a:srgbClr val="00B050"/>
                 </a:solidFill>
               </a:rPr>
+              <a:t> Modell</a:t>
+            </a:r>
+            <a:endParaRPr lang="de-CH" dirty="0"/>
+          </a:p>
+        </p:txBody>
+      </p:sp>
+      <p:sp>
+        <p:nvSpPr>
+          <p:cNvPr id="3" name="Inhaltsplatzhalter 2"/>
+          <p:cNvSpPr>
+            <a:spLocks noGrp="1"/>
+          </p:cNvSpPr>
+          <p:nvPr>
+            <p:ph idx="1"/>
+          </p:nvPr>
+        </p:nvSpPr>
+        <p:spPr/>
+        <p:txBody>
+          <a:bodyPr/>
+          <a:lstStyle/>
+          <a:p>
+            <a:r>
+              <a:rPr lang="de-CH" dirty="0" smtClean="0"/>
+              <a:t>Aufgrund unserer Evaluation entscheiden wir uns für Agiles Entwickeln</a:t>
+            </a:r>
+          </a:p>
+          <a:p>
+            <a:r>
+              <a:rPr lang="de-CH" dirty="0" err="1" smtClean="0"/>
+              <a:t>Incremental</a:t>
+            </a:r>
+            <a:r>
+              <a:rPr lang="de-CH" dirty="0" smtClean="0"/>
               <a:t> </a:t>
             </a:r>
+            <a:r>
+              <a:rPr lang="de-CH" dirty="0" err="1" smtClean="0"/>
+              <a:t>developement</a:t>
+            </a:r>
+            <a:endParaRPr lang="de-CH" dirty="0" smtClean="0"/>
+          </a:p>
+          <a:p>
+            <a:r>
+              <a:rPr lang="de-CH" dirty="0" smtClean="0"/>
+              <a:t>Verschiedene Versionen</a:t>
+            </a:r>
+            <a:br>
+              <a:rPr lang="de-CH" dirty="0" smtClean="0"/>
+            </a:br>
+            <a:r>
+              <a:rPr lang="de-CH" dirty="0" smtClean="0"/>
+              <a:t>der Software</a:t>
+            </a:r>
+          </a:p>
+          <a:p>
+            <a:endParaRPr lang="de-CH" dirty="0"/>
+          </a:p>
+          <a:p>
+            <a:pPr marL="0" indent="0">
+              <a:buNone/>
+            </a:pPr>
+            <a:endParaRPr lang="de-CH" dirty="0"/>
+          </a:p>
+        </p:txBody>
+      </p:sp>
+      <p:pic>
+        <p:nvPicPr>
+          <p:cNvPr id="4" name="Grafik 3"/>
+          <p:cNvPicPr>
+            <a:picLocks noChangeAspect="1"/>
+          </p:cNvPicPr>
+          <p:nvPr/>
+        </p:nvPicPr>
+        <p:blipFill>
+          <a:blip r:embed="rId2"/>
+          <a:stretch>
+            <a:fillRect/>
+          </a:stretch>
+        </p:blipFill>
+        <p:spPr>
+          <a:xfrm>
+            <a:off x="5115487" y="3000349"/>
+            <a:ext cx="6565652" cy="3648422"/>
+          </a:xfrm>
+          <a:prstGeom prst="rect">
+            <a:avLst/>
+          </a:prstGeom>
+        </p:spPr>
+      </p:pic>
+    </p:spTree>
+    <p:extLst>
+      <p:ext uri="{BB962C8B-B14F-4D97-AF65-F5344CB8AC3E}">
+        <p14:creationId xmlns:p14="http://schemas.microsoft.com/office/powerpoint/2010/main" val="4073794779"/>
+      </p:ext>
+    </p:extLst>
+  </p:cSld>
+  <p:clrMapOvr>
+    <a:masterClrMapping/>
+  </p:clrMapOvr>
+  <p:timing>
+    <p:tnLst>
+      <p:par>
+        <p:cTn id="1" dur="indefinite" restart="never" nodeType="tmRoot"/>
+      </p:par>
+    </p:tnLst>
+  </p:timing>
+</p:sld>
+</file>
+
+<file path=ppt/slides/slide5.xml><?xml version="1.0" encoding="utf-8"?>
+<p:sld xmlns:a="http://schemas.openxmlformats.org/drawingml/2006/main" xmlns:r="http://schemas.openxmlformats.org/officeDocument/2006/relationships" xmlns:p="http://schemas.openxmlformats.org/presentationml/2006/main">
+  <p:cSld>
+    <p:spTree>
+      <p:nvGrpSpPr>
+        <p:cNvPr id="1" name=""/>
+        <p:cNvGrpSpPr/>
+        <p:nvPr/>
+      </p:nvGrpSpPr>
+      <p:grpSpPr>
+        <a:xfrm>
+          <a:off x="0" y="0"/>
+          <a:ext cx="0" cy="0"/>
+          <a:chOff x="0" y="0"/>
+          <a:chExt cx="0" cy="0"/>
+        </a:xfrm>
+      </p:grpSpPr>
+      <p:sp>
+        <p:nvSpPr>
+          <p:cNvPr id="2" name="Titel 1"/>
+          <p:cNvSpPr>
+            <a:spLocks noGrp="1"/>
+          </p:cNvSpPr>
+          <p:nvPr>
+            <p:ph type="title"/>
+          </p:nvPr>
+        </p:nvSpPr>
+        <p:spPr/>
+        <p:txBody>
+          <a:bodyPr/>
+          <a:lstStyle/>
+          <a:p>
             <a:r>
               <a:rPr lang="de-CH" b="1" dirty="0" smtClean="0">
                 <a:solidFill>
                   <a:srgbClr val="00B050"/>
                 </a:solidFill>
               </a:rPr>
-              <a:t>Modell</a:t>
-            </a:r>
-            <a:endParaRPr lang="de-CH" dirty="0"/>
-          </a:p>
-        </p:txBody>
-      </p:sp>
-      <p:sp>
-        <p:nvSpPr>
-          <p:cNvPr id="3" name="Inhaltsplatzhalter 2"/>
-          <p:cNvSpPr>
-            <a:spLocks noGrp="1"/>
-          </p:cNvSpPr>
-          <p:nvPr>
-            <p:ph idx="1"/>
-          </p:nvPr>
-        </p:nvSpPr>
-        <p:spPr/>
-        <p:txBody>
-          <a:bodyPr/>
-          <a:lstStyle/>
-          <a:p>
-            <a:endParaRPr lang="de-CH" dirty="0"/>
-          </a:p>
-        </p:txBody>
-      </p:sp>
+              <a:t>2. </a:t>
+            </a:r>
+            <a:r>
+              <a:rPr lang="de-CH" b="1" dirty="0" err="1" smtClean="0">
+                <a:solidFill>
+                  <a:srgbClr val="00B050"/>
+                </a:solidFill>
+              </a:rPr>
+              <a:t>Process</a:t>
+            </a:r>
+            <a:r>
+              <a:rPr lang="de-CH" b="1" dirty="0" smtClean="0">
+                <a:solidFill>
+                  <a:srgbClr val="00B050"/>
+                </a:solidFill>
+              </a:rPr>
+              <a:t> Modell</a:t>
+            </a:r>
+            <a:endParaRPr lang="de-CH" b="1" dirty="0">
+              <a:solidFill>
+                <a:srgbClr val="00B050"/>
+              </a:solidFill>
+            </a:endParaRPr>
+          </a:p>
+        </p:txBody>
+      </p:sp>
+      <p:graphicFrame>
+        <p:nvGraphicFramePr>
+          <p:cNvPr id="6" name="Tabelle 5"/>
+          <p:cNvGraphicFramePr>
+            <a:graphicFrameLocks noGrp="1"/>
+          </p:cNvGraphicFramePr>
+          <p:nvPr>
+            <p:extLst>
+              <p:ext uri="{D42A27DB-BD31-4B8C-83A1-F6EECF244321}">
+                <p14:modId xmlns:p14="http://schemas.microsoft.com/office/powerpoint/2010/main" val="2834102275"/>
+              </p:ext>
+            </p:extLst>
+          </p:nvPr>
+        </p:nvGraphicFramePr>
+        <p:xfrm>
+          <a:off x="838198" y="1424065"/>
+          <a:ext cx="10794168" cy="5172826"/>
+        </p:xfrm>
+        <a:graphic>
+          <a:graphicData uri="http://schemas.openxmlformats.org/drawingml/2006/table">
+            <a:tbl>
+              <a:tblPr firstRow="1" bandRow="1">
+                <a:tableStyleId>{5C22544A-7EE6-4342-B048-85BDC9FD1C3A}</a:tableStyleId>
+              </a:tblPr>
+              <a:tblGrid>
+                <a:gridCol w="2204805"/>
+                <a:gridCol w="4047345"/>
+                <a:gridCol w="4542018"/>
+              </a:tblGrid>
+              <a:tr h="351013">
+                <a:tc>
+                  <a:txBody>
+                    <a:bodyPr/>
+                    <a:lstStyle/>
+                    <a:p>
+                      <a:r>
+                        <a:rPr lang="de-CH" sz="2000" dirty="0" err="1" smtClean="0"/>
+                        <a:t>Process</a:t>
+                      </a:r>
+                      <a:endParaRPr lang="de-CH" sz="2000" dirty="0"/>
+                    </a:p>
+                  </a:txBody>
+                  <a:tcPr marL="94380" marR="94380" marT="47190" marB="47190">
+                    <a:solidFill>
+                      <a:srgbClr val="00B050"/>
+                    </a:solidFill>
+                  </a:tcPr>
+                </a:tc>
+                <a:tc>
+                  <a:txBody>
+                    <a:bodyPr/>
+                    <a:lstStyle/>
+                    <a:p>
+                      <a:r>
+                        <a:rPr lang="de-CH" sz="2000" dirty="0" smtClean="0"/>
+                        <a:t>Ziel</a:t>
+                      </a:r>
+                      <a:endParaRPr lang="de-CH" sz="2000" dirty="0"/>
+                    </a:p>
+                  </a:txBody>
+                  <a:tcPr marL="94380" marR="94380" marT="47190" marB="47190">
+                    <a:solidFill>
+                      <a:srgbClr val="00B050"/>
+                    </a:solidFill>
+                  </a:tcPr>
+                </a:tc>
+                <a:tc>
+                  <a:txBody>
+                    <a:bodyPr/>
+                    <a:lstStyle/>
+                    <a:p>
+                      <a:r>
+                        <a:rPr lang="de-CH" sz="2000" dirty="0" smtClean="0"/>
+                        <a:t>Tasks</a:t>
+                      </a:r>
+                      <a:endParaRPr lang="de-CH" sz="2000" dirty="0"/>
+                    </a:p>
+                  </a:txBody>
+                  <a:tcPr marL="94380" marR="94380" marT="47190" marB="47190">
+                    <a:solidFill>
+                      <a:srgbClr val="00B050"/>
+                    </a:solidFill>
+                  </a:tcPr>
+                </a:tc>
+              </a:tr>
+              <a:tr h="769404">
+                <a:tc>
+                  <a:txBody>
+                    <a:bodyPr/>
+                    <a:lstStyle/>
+                    <a:p>
+                      <a:r>
+                        <a:rPr lang="de-CH" sz="1600" dirty="0" smtClean="0"/>
+                        <a:t>Analysis</a:t>
+                      </a:r>
+                      <a:endParaRPr lang="de-CH" sz="1600" dirty="0"/>
+                    </a:p>
+                  </a:txBody>
+                  <a:tcPr marL="94380" marR="94380" marT="47190" marB="47190">
+                    <a:solidFill>
+                      <a:srgbClr val="99FF66"/>
+                    </a:solidFill>
+                  </a:tcPr>
+                </a:tc>
+                <a:tc>
+                  <a:txBody>
+                    <a:bodyPr/>
+                    <a:lstStyle/>
+                    <a:p>
+                      <a:r>
+                        <a:rPr lang="de-CH" sz="1600" dirty="0" smtClean="0"/>
+                        <a:t>Wir wissen was die Anforderungen</a:t>
+                      </a:r>
+                      <a:r>
+                        <a:rPr lang="de-CH" sz="1600" baseline="0" dirty="0" smtClean="0"/>
+                        <a:t> an das fertige Produkt sind.</a:t>
+                      </a:r>
+                    </a:p>
+                  </a:txBody>
+                  <a:tcPr marL="94380" marR="94380" marT="47190" marB="47190">
+                    <a:solidFill>
+                      <a:srgbClr val="99FF66"/>
+                    </a:solidFill>
+                  </a:tcPr>
+                </a:tc>
+                <a:tc>
+                  <a:txBody>
+                    <a:bodyPr/>
+                    <a:lstStyle/>
+                    <a:p>
+                      <a:r>
+                        <a:rPr lang="de-CH" sz="1600" baseline="0" dirty="0" smtClean="0"/>
+                        <a:t>Projektauftrag MHC-PMS analysieren </a:t>
+                      </a:r>
+                      <a:r>
+                        <a:rPr lang="de-CH" sz="1600" baseline="0" dirty="0" smtClean="0">
+                          <a:sym typeface="Wingdings" panose="05000000000000000000" pitchFamily="2" charset="2"/>
+                        </a:rPr>
+                        <a:t> Task 1</a:t>
+                      </a:r>
+                      <a:endParaRPr lang="de-CH" sz="1600" dirty="0"/>
+                    </a:p>
+                  </a:txBody>
+                  <a:tcPr marL="94380" marR="94380" marT="47190" marB="47190">
+                    <a:solidFill>
+                      <a:srgbClr val="99FF66"/>
+                    </a:solidFill>
+                  </a:tcPr>
+                </a:tc>
+              </a:tr>
+              <a:tr h="726242">
+                <a:tc>
+                  <a:txBody>
+                    <a:bodyPr/>
+                    <a:lstStyle/>
+                    <a:p>
+                      <a:r>
+                        <a:rPr lang="de-CH" sz="1600" dirty="0" err="1" smtClean="0"/>
+                        <a:t>Specification</a:t>
+                      </a:r>
+                      <a:endParaRPr lang="de-CH" sz="1600" dirty="0"/>
+                    </a:p>
+                  </a:txBody>
+                  <a:tcPr marL="94380" marR="94380" marT="47190" marB="47190">
+                    <a:solidFill>
+                      <a:srgbClr val="CCFF99"/>
+                    </a:solidFill>
+                  </a:tcPr>
+                </a:tc>
+                <a:tc>
+                  <a:txBody>
+                    <a:bodyPr/>
+                    <a:lstStyle/>
+                    <a:p>
+                      <a:r>
+                        <a:rPr lang="de-CH" sz="1600" dirty="0" smtClean="0"/>
+                        <a:t>Dokumentation</a:t>
+                      </a:r>
+                      <a:r>
+                        <a:rPr lang="de-CH" sz="1600" baseline="0" dirty="0" smtClean="0"/>
+                        <a:t> zur Implementation des Produktes</a:t>
+                      </a:r>
+                      <a:endParaRPr lang="de-CH" sz="1600" dirty="0"/>
+                    </a:p>
+                  </a:txBody>
+                  <a:tcPr marL="94380" marR="94380" marT="47190" marB="47190">
+                    <a:solidFill>
+                      <a:srgbClr val="CCFF99"/>
+                    </a:solidFill>
+                  </a:tcPr>
+                </a:tc>
+                <a:tc>
+                  <a:txBody>
+                    <a:bodyPr/>
+                    <a:lstStyle/>
+                    <a:p>
+                      <a:r>
+                        <a:rPr lang="de-CH" sz="1600" dirty="0" smtClean="0"/>
+                        <a:t>Programm</a:t>
+                      </a:r>
+                      <a:r>
+                        <a:rPr lang="de-CH" sz="1600" baseline="0" dirty="0" smtClean="0"/>
+                        <a:t>komponenten ausarbeiten</a:t>
+                      </a:r>
+                    </a:p>
+                    <a:p>
+                      <a:r>
+                        <a:rPr lang="de-CH" sz="1600" baseline="0" dirty="0" smtClean="0"/>
+                        <a:t>Datenmodell erstellen</a:t>
+                      </a:r>
+                      <a:endParaRPr lang="de-CH" sz="1600" dirty="0"/>
+                    </a:p>
+                  </a:txBody>
+                  <a:tcPr marL="94380" marR="94380" marT="47190" marB="47190">
+                    <a:solidFill>
+                      <a:srgbClr val="CCFF99"/>
+                    </a:solidFill>
+                  </a:tcPr>
+                </a:tc>
+              </a:tr>
+              <a:tr h="940659">
+                <a:tc>
+                  <a:txBody>
+                    <a:bodyPr/>
+                    <a:lstStyle/>
+                    <a:p>
+                      <a:r>
+                        <a:rPr lang="de-CH" sz="1600" dirty="0" smtClean="0"/>
+                        <a:t>Design</a:t>
+                      </a:r>
+                      <a:endParaRPr lang="de-CH" sz="1600" dirty="0"/>
+                    </a:p>
+                  </a:txBody>
+                  <a:tcPr marL="94380" marR="94380" marT="47190" marB="47190">
+                    <a:solidFill>
+                      <a:srgbClr val="99FF66"/>
+                    </a:solidFill>
+                  </a:tcPr>
+                </a:tc>
+                <a:tc>
+                  <a:txBody>
+                    <a:bodyPr/>
+                    <a:lstStyle/>
+                    <a:p>
+                      <a:r>
+                        <a:rPr lang="de-CH" sz="1600" dirty="0" smtClean="0"/>
+                        <a:t>Ressourcenplan</a:t>
+                      </a:r>
+                    </a:p>
+                    <a:p>
+                      <a:r>
+                        <a:rPr lang="de-CH" sz="1600" dirty="0" smtClean="0"/>
+                        <a:t>Klare</a:t>
+                      </a:r>
+                      <a:r>
+                        <a:rPr lang="de-CH" sz="1600" baseline="0" dirty="0" smtClean="0"/>
+                        <a:t> Arbeitsverteilung</a:t>
+                      </a:r>
+                      <a:endParaRPr lang="de-CH" sz="1600" dirty="0"/>
+                    </a:p>
+                  </a:txBody>
+                  <a:tcPr marL="94380" marR="94380" marT="47190" marB="47190">
+                    <a:solidFill>
+                      <a:srgbClr val="99FF66"/>
+                    </a:solidFill>
+                  </a:tcPr>
+                </a:tc>
+                <a:tc>
+                  <a:txBody>
+                    <a:bodyPr/>
+                    <a:lstStyle/>
+                    <a:p>
+                      <a:r>
+                        <a:rPr lang="de-CH" sz="1600" dirty="0" smtClean="0"/>
+                        <a:t>Zeiteinteilung / Arbeitseinteilung und Ressourcenverfügbarkeit planen</a:t>
+                      </a:r>
+                      <a:endParaRPr lang="de-CH" sz="1600" dirty="0"/>
+                    </a:p>
+                  </a:txBody>
+                  <a:tcPr marL="94380" marR="94380" marT="47190" marB="47190">
+                    <a:solidFill>
+                      <a:srgbClr val="99FF66"/>
+                    </a:solidFill>
+                  </a:tcPr>
+                </a:tc>
+              </a:tr>
+              <a:tr h="731631">
+                <a:tc>
+                  <a:txBody>
+                    <a:bodyPr/>
+                    <a:lstStyle/>
+                    <a:p>
+                      <a:r>
+                        <a:rPr lang="de-CH" sz="1600" dirty="0" smtClean="0"/>
+                        <a:t>Implementation</a:t>
+                      </a:r>
+                      <a:endParaRPr lang="de-CH" sz="1600" dirty="0"/>
+                    </a:p>
+                  </a:txBody>
+                  <a:tcPr marL="94380" marR="94380" marT="47190" marB="47190">
+                    <a:solidFill>
+                      <a:srgbClr val="CCFF99"/>
+                    </a:solidFill>
+                  </a:tcPr>
+                </a:tc>
+                <a:tc>
+                  <a:txBody>
+                    <a:bodyPr/>
+                    <a:lstStyle/>
+                    <a:p>
+                      <a:r>
+                        <a:rPr lang="de-CH" sz="1600" dirty="0" smtClean="0"/>
+                        <a:t>Teilprojekt</a:t>
+                      </a:r>
+                      <a:r>
+                        <a:rPr lang="de-CH" sz="1600" baseline="0" dirty="0" smtClean="0"/>
+                        <a:t> des Programmes fertiggestellt</a:t>
+                      </a:r>
+                      <a:endParaRPr lang="de-CH" sz="1600" dirty="0"/>
+                    </a:p>
+                  </a:txBody>
+                  <a:tcPr marL="94380" marR="94380" marT="47190" marB="47190">
+                    <a:solidFill>
+                      <a:srgbClr val="CCFF99"/>
+                    </a:solidFill>
+                  </a:tcPr>
+                </a:tc>
+                <a:tc>
+                  <a:txBody>
+                    <a:bodyPr/>
+                    <a:lstStyle/>
+                    <a:p>
+                      <a:r>
+                        <a:rPr lang="de-CH" sz="1600" dirty="0" smtClean="0"/>
+                        <a:t>Implementieren von versch.</a:t>
+                      </a:r>
+                      <a:r>
+                        <a:rPr lang="de-CH" sz="1600" baseline="0" dirty="0"/>
+                        <a:t> </a:t>
+                      </a:r>
+                      <a:r>
+                        <a:rPr lang="de-CH" sz="1600" baseline="0" dirty="0" smtClean="0"/>
+                        <a:t>Modulen</a:t>
+                      </a:r>
+                    </a:p>
+                    <a:p>
+                      <a:r>
+                        <a:rPr lang="de-CH" sz="1600" baseline="0" dirty="0" smtClean="0"/>
+                        <a:t>Teammeetings</a:t>
+                      </a:r>
+                      <a:endParaRPr lang="de-CH" sz="1600" dirty="0" smtClean="0"/>
+                    </a:p>
+                  </a:txBody>
+                  <a:tcPr marL="94380" marR="94380" marT="47190" marB="47190">
+                    <a:solidFill>
+                      <a:srgbClr val="CCFF99"/>
+                    </a:solidFill>
+                  </a:tcPr>
+                </a:tc>
+              </a:tr>
+              <a:tr h="511825">
+                <a:tc>
+                  <a:txBody>
+                    <a:bodyPr/>
+                    <a:lstStyle/>
+                    <a:p>
+                      <a:r>
+                        <a:rPr lang="de-CH" sz="1600" dirty="0" smtClean="0"/>
+                        <a:t>Test</a:t>
+                      </a:r>
+                      <a:endParaRPr lang="de-CH" sz="1600" dirty="0"/>
+                    </a:p>
+                  </a:txBody>
+                  <a:tcPr marL="94380" marR="94380" marT="47190" marB="47190">
+                    <a:solidFill>
+                      <a:srgbClr val="99FF66"/>
+                    </a:solidFill>
+                  </a:tcPr>
+                </a:tc>
+                <a:tc>
+                  <a:txBody>
+                    <a:bodyPr/>
+                    <a:lstStyle/>
+                    <a:p>
+                      <a:r>
+                        <a:rPr lang="de-CH" sz="1600" dirty="0" smtClean="0"/>
+                        <a:t>Lauffähige Version</a:t>
+                      </a:r>
+                      <a:r>
+                        <a:rPr lang="de-CH" sz="1600" baseline="0" dirty="0" smtClean="0"/>
+                        <a:t> des Programmes </a:t>
+                      </a:r>
+                      <a:endParaRPr lang="de-CH" sz="1600" dirty="0"/>
+                    </a:p>
+                  </a:txBody>
+                  <a:tcPr marL="94380" marR="94380" marT="47190" marB="47190">
+                    <a:solidFill>
+                      <a:srgbClr val="99FF66"/>
+                    </a:solidFill>
+                  </a:tcPr>
+                </a:tc>
+                <a:tc>
+                  <a:txBody>
+                    <a:bodyPr/>
+                    <a:lstStyle/>
+                    <a:p>
+                      <a:r>
+                        <a:rPr lang="de-CH" sz="1600" dirty="0" smtClean="0"/>
+                        <a:t>Testen </a:t>
+                      </a:r>
+                      <a:endParaRPr lang="de-CH" sz="1600" dirty="0"/>
+                    </a:p>
+                  </a:txBody>
+                  <a:tcPr marL="94380" marR="94380" marT="47190" marB="47190">
+                    <a:solidFill>
+                      <a:srgbClr val="99FF66"/>
+                    </a:solidFill>
+                  </a:tcPr>
+                </a:tc>
+              </a:tr>
+              <a:tr h="511825">
+                <a:tc>
+                  <a:txBody>
+                    <a:bodyPr/>
+                    <a:lstStyle/>
+                    <a:p>
+                      <a:r>
+                        <a:rPr lang="de-CH" sz="1600" dirty="0" smtClean="0"/>
+                        <a:t>Validation</a:t>
+                      </a:r>
+                      <a:endParaRPr lang="de-CH" sz="1600" dirty="0"/>
+                    </a:p>
+                  </a:txBody>
+                  <a:tcPr marL="94380" marR="94380" marT="47190" marB="47190">
+                    <a:solidFill>
+                      <a:srgbClr val="99FF66"/>
+                    </a:solidFill>
+                  </a:tcPr>
+                </a:tc>
+                <a:tc>
+                  <a:txBody>
+                    <a:bodyPr/>
+                    <a:lstStyle/>
+                    <a:p>
+                      <a:r>
+                        <a:rPr lang="de-CH" sz="1600" dirty="0" smtClean="0"/>
+                        <a:t>Anträge</a:t>
+                      </a:r>
+                      <a:r>
+                        <a:rPr lang="de-CH" sz="1600" baseline="0" dirty="0" smtClean="0"/>
+                        <a:t> für Erweiterungen oder OK</a:t>
+                      </a:r>
+                      <a:endParaRPr lang="de-CH" sz="1600" dirty="0"/>
+                    </a:p>
+                  </a:txBody>
+                  <a:tcPr marL="94380" marR="94380" marT="47190" marB="47190">
+                    <a:solidFill>
+                      <a:srgbClr val="99FF66"/>
+                    </a:solidFill>
+                  </a:tcPr>
+                </a:tc>
+                <a:tc>
+                  <a:txBody>
+                    <a:bodyPr/>
+                    <a:lstStyle/>
+                    <a:p>
+                      <a:r>
+                        <a:rPr lang="de-CH" sz="1600" dirty="0" smtClean="0"/>
+                        <a:t>Feedback einholen</a:t>
+                      </a:r>
+                      <a:endParaRPr lang="de-CH" sz="1600" dirty="0"/>
+                    </a:p>
+                  </a:txBody>
+                  <a:tcPr marL="94380" marR="94380" marT="47190" marB="47190">
+                    <a:solidFill>
+                      <a:srgbClr val="99FF66"/>
+                    </a:solidFill>
+                  </a:tcPr>
+                </a:tc>
+              </a:tr>
+              <a:tr h="569047">
+                <a:tc>
+                  <a:txBody>
+                    <a:bodyPr/>
+                    <a:lstStyle/>
+                    <a:p>
+                      <a:r>
+                        <a:rPr lang="de-CH" sz="1600" dirty="0" smtClean="0"/>
+                        <a:t>Final</a:t>
+                      </a:r>
+                      <a:r>
+                        <a:rPr lang="de-CH" sz="1600" baseline="0" dirty="0" smtClean="0"/>
+                        <a:t> </a:t>
+                      </a:r>
+                      <a:r>
+                        <a:rPr lang="de-CH" sz="1600" baseline="0" dirty="0" err="1" smtClean="0"/>
+                        <a:t>version</a:t>
+                      </a:r>
+                      <a:endParaRPr lang="de-CH" sz="1600" dirty="0"/>
+                    </a:p>
+                  </a:txBody>
+                  <a:tcPr marL="94380" marR="94380" marT="47190" marB="47190">
+                    <a:solidFill>
+                      <a:srgbClr val="CCFF99"/>
+                    </a:solidFill>
+                  </a:tcPr>
+                </a:tc>
+                <a:tc>
+                  <a:txBody>
+                    <a:bodyPr/>
+                    <a:lstStyle/>
+                    <a:p>
+                      <a:r>
+                        <a:rPr lang="de-CH" sz="1600" dirty="0" smtClean="0"/>
+                        <a:t>Lauffähiges Programm </a:t>
+                      </a:r>
+                      <a:r>
+                        <a:rPr lang="de-CH" sz="1600" dirty="0" err="1" smtClean="0"/>
+                        <a:t>releasen</a:t>
+                      </a:r>
+                      <a:endParaRPr lang="de-CH" sz="1600" dirty="0"/>
+                    </a:p>
+                  </a:txBody>
+                  <a:tcPr marL="94380" marR="94380" marT="47190" marB="47190">
+                    <a:solidFill>
+                      <a:srgbClr val="CCFF99"/>
+                    </a:solidFill>
+                  </a:tcPr>
+                </a:tc>
+                <a:tc>
+                  <a:txBody>
+                    <a:bodyPr/>
+                    <a:lstStyle/>
+                    <a:p>
+                      <a:r>
+                        <a:rPr lang="de-CH" sz="1600" dirty="0" smtClean="0"/>
+                        <a:t>Testen gesamtes Produkt</a:t>
+                      </a:r>
+                    </a:p>
+                    <a:p>
+                      <a:r>
+                        <a:rPr lang="de-CH" sz="1600" dirty="0" smtClean="0"/>
+                        <a:t>Auslieferung</a:t>
+                      </a:r>
+                      <a:endParaRPr lang="de-CH" sz="1600" dirty="0"/>
+                    </a:p>
+                  </a:txBody>
+                  <a:tcPr marL="94380" marR="94380" marT="47190" marB="47190">
+                    <a:solidFill>
+                      <a:srgbClr val="CCFF99"/>
+                    </a:solidFill>
+                  </a:tcPr>
+                </a:tc>
+              </a:tr>
+            </a:tbl>
+          </a:graphicData>
+        </a:graphic>
+      </p:graphicFrame>
+      <p:grpSp>
+        <p:nvGrpSpPr>
+          <p:cNvPr id="18" name="Gruppieren 17"/>
+          <p:cNvGrpSpPr/>
+          <p:nvPr/>
+        </p:nvGrpSpPr>
+        <p:grpSpPr>
+          <a:xfrm>
+            <a:off x="329784" y="2893102"/>
+            <a:ext cx="508414" cy="2863121"/>
+            <a:chOff x="329784" y="2893102"/>
+            <a:chExt cx="508414" cy="2863121"/>
+          </a:xfrm>
+        </p:grpSpPr>
+        <p:cxnSp>
+          <p:nvCxnSpPr>
+            <p:cNvPr id="11" name="Gerader Verbinder 10"/>
+            <p:cNvCxnSpPr/>
+            <p:nvPr/>
+          </p:nvCxnSpPr>
+          <p:spPr>
+            <a:xfrm flipH="1">
+              <a:off x="359764" y="5756223"/>
+              <a:ext cx="478434" cy="0"/>
+            </a:xfrm>
+            <a:prstGeom prst="line">
+              <a:avLst/>
+            </a:prstGeom>
+            <a:ln w="50800">
+              <a:solidFill>
+                <a:srgbClr val="00B050"/>
+              </a:solidFill>
+            </a:ln>
+          </p:spPr>
+          <p:style>
+            <a:lnRef idx="1">
+              <a:schemeClr val="accent6"/>
+            </a:lnRef>
+            <a:fillRef idx="0">
+              <a:schemeClr val="accent6"/>
+            </a:fillRef>
+            <a:effectRef idx="0">
+              <a:schemeClr val="accent6"/>
+            </a:effectRef>
+            <a:fontRef idx="minor">
+              <a:schemeClr val="tx1"/>
+            </a:fontRef>
+          </p:style>
+        </p:cxnSp>
+        <p:cxnSp>
+          <p:nvCxnSpPr>
+            <p:cNvPr id="13" name="Gerade Verbindung mit Pfeil 12"/>
+            <p:cNvCxnSpPr/>
+            <p:nvPr/>
+          </p:nvCxnSpPr>
+          <p:spPr>
+            <a:xfrm>
+              <a:off x="329784" y="2893102"/>
+              <a:ext cx="508414" cy="0"/>
+            </a:xfrm>
+            <a:prstGeom prst="straightConnector1">
+              <a:avLst/>
+            </a:prstGeom>
+            <a:ln w="50800">
+              <a:solidFill>
+                <a:srgbClr val="00B050"/>
+              </a:solidFill>
+              <a:tailEnd type="triangle"/>
+            </a:ln>
+          </p:spPr>
+          <p:style>
+            <a:lnRef idx="1">
+              <a:schemeClr val="accent6"/>
+            </a:lnRef>
+            <a:fillRef idx="0">
+              <a:schemeClr val="accent6"/>
+            </a:fillRef>
+            <a:effectRef idx="0">
+              <a:schemeClr val="accent6"/>
+            </a:effectRef>
+            <a:fontRef idx="minor">
+              <a:schemeClr val="tx1"/>
+            </a:fontRef>
+          </p:style>
+        </p:cxnSp>
+        <p:cxnSp>
+          <p:nvCxnSpPr>
+            <p:cNvPr id="15" name="Gerader Verbinder 14"/>
+            <p:cNvCxnSpPr/>
+            <p:nvPr/>
+          </p:nvCxnSpPr>
+          <p:spPr>
+            <a:xfrm>
+              <a:off x="344774" y="2893102"/>
+              <a:ext cx="14990" cy="2863121"/>
+            </a:xfrm>
+            <a:prstGeom prst="line">
+              <a:avLst/>
+            </a:prstGeom>
+            <a:ln w="50800">
+              <a:solidFill>
+                <a:srgbClr val="00B050"/>
+              </a:solidFill>
+            </a:ln>
+          </p:spPr>
+          <p:style>
+            <a:lnRef idx="1">
+              <a:schemeClr val="accent6"/>
+            </a:lnRef>
+            <a:fillRef idx="0">
+              <a:schemeClr val="accent6"/>
+            </a:fillRef>
+            <a:effectRef idx="0">
+              <a:schemeClr val="accent6"/>
+            </a:effectRef>
+            <a:fontRef idx="minor">
+              <a:schemeClr val="tx1"/>
+            </a:fontRef>
+          </p:style>
+        </p:cxnSp>
+      </p:grpSp>
     </p:spTree>
     <p:extLst>
       <p:ext uri="{BB962C8B-B14F-4D97-AF65-F5344CB8AC3E}">
-        <p14:creationId xmlns:p14="http://schemas.microsoft.com/office/powerpoint/2010/main" val="4073794779"/>
+        <p14:creationId xmlns:p14="http://schemas.microsoft.com/office/powerpoint/2010/main" val="642442710"/>
       </p:ext>
     </p:extLst>
   </p:cSld>

</xml_diff>

<commit_message>
Prozessmodel in der Präsentation von Task2 angepasst
</commit_message>
<xml_diff>
--- a/doc/task02/Task2.pptx
+++ b/doc/task02/Task2.pptx
@@ -10,6 +10,7 @@
     <p:sldId id="258" r:id="rId4"/>
     <p:sldId id="259" r:id="rId5"/>
     <p:sldId id="261" r:id="rId6"/>
+    <p:sldId id="262" r:id="rId7"/>
   </p:sldIdLst>
   <p:sldSz cx="12192000" cy="6858000"/>
   <p:notesSz cx="6858000" cy="9144000"/>
@@ -110,7 +111,7 @@
   </p:defaultTextStyle>
   <p:extLst>
     <p:ext uri="{EFAFB233-063F-42B5-8137-9DF3F51BA10A}">
-      <p15:sldGuideLst xmlns:p15="http://schemas.microsoft.com/office/powerpoint/2012/main">
+      <p15:sldGuideLst xmlns:p15="http://schemas.microsoft.com/office/powerpoint/2012/main" xmlns="">
         <p15:guide id="1" orient="horz" pos="2160">
           <p15:clr>
             <a:srgbClr val="A4A3A4"/>
@@ -3077,6 +3078,13 @@
   <p:clrMapOvr>
     <a:masterClrMapping/>
   </p:clrMapOvr>
+  <p:timing>
+    <p:tnLst>
+      <p:par>
+        <p:cTn id="1" dur="indefinite" restart="never" nodeType="tmRoot"/>
+      </p:par>
+    </p:tnLst>
+  </p:timing>
 </p:sld>
 </file>
 
@@ -3486,11 +3494,7 @@
                       </a:r>
                       <a:r>
                         <a:rPr lang="de-CH" baseline="0" dirty="0" smtClean="0"/>
-                        <a:t> </a:t>
-                      </a:r>
-                      <a:r>
-                        <a:rPr lang="de-CH" baseline="0" dirty="0" smtClean="0"/>
-                        <a:t>der Ziele einfacher aufzufangen</a:t>
+                        <a:t> der Ziele einfacher aufzufangen</a:t>
                       </a:r>
                     </a:p>
                     <a:p>
@@ -3648,65 +3652,6 @@
           </a:p>
         </p:txBody>
       </p:sp>
-      <p:sp>
-        <p:nvSpPr>
-          <p:cNvPr id="3" name="Inhaltsplatzhalter 2"/>
-          <p:cNvSpPr>
-            <a:spLocks noGrp="1"/>
-          </p:cNvSpPr>
-          <p:nvPr>
-            <p:ph idx="1"/>
-          </p:nvPr>
-        </p:nvSpPr>
-        <p:spPr/>
-        <p:txBody>
-          <a:bodyPr/>
-          <a:lstStyle/>
-          <a:p>
-            <a:r>
-              <a:rPr lang="de-CH" dirty="0" smtClean="0"/>
-              <a:t>Aufgrund unserer Evaluation entscheiden wir uns für Agiles Entwickeln</a:t>
-            </a:r>
-          </a:p>
-          <a:p>
-            <a:r>
-              <a:rPr lang="de-CH" dirty="0" err="1" smtClean="0"/>
-              <a:t>Incremental</a:t>
-            </a:r>
-            <a:r>
-              <a:rPr lang="de-CH" dirty="0" smtClean="0"/>
-              <a:t> </a:t>
-            </a:r>
-            <a:r>
-              <a:rPr lang="de-CH" dirty="0" err="1" smtClean="0"/>
-              <a:t>developement</a:t>
-            </a:r>
-            <a:endParaRPr lang="de-CH" dirty="0" smtClean="0"/>
-          </a:p>
-          <a:p>
-            <a:r>
-              <a:rPr lang="de-CH" dirty="0" smtClean="0"/>
-              <a:t>Verschiedene Versionen</a:t>
-            </a:r>
-            <a:br>
-              <a:rPr lang="de-CH" dirty="0" smtClean="0"/>
-            </a:br>
-            <a:r>
-              <a:rPr lang="de-CH" dirty="0" smtClean="0"/>
-              <a:t>der Software</a:t>
-            </a:r>
-          </a:p>
-          <a:p>
-            <a:endParaRPr lang="de-CH" dirty="0"/>
-          </a:p>
-          <a:p>
-            <a:pPr marL="0" indent="0">
-              <a:buNone/>
-            </a:pPr>
-            <a:endParaRPr lang="de-CH" dirty="0"/>
-          </a:p>
-        </p:txBody>
-      </p:sp>
       <p:pic>
         <p:nvPicPr>
           <p:cNvPr id="4" name="Grafik 3"/>
@@ -3723,14 +3668,101 @@
         </p:blipFill>
         <p:spPr>
           <a:xfrm>
-            <a:off x="5115487" y="3000349"/>
-            <a:ext cx="6565652" cy="3648422"/>
+            <a:off x="6674266" y="3581463"/>
+            <a:ext cx="4673588" cy="2597034"/>
           </a:xfrm>
           <a:prstGeom prst="rect">
             <a:avLst/>
           </a:prstGeom>
         </p:spPr>
       </p:pic>
+      <p:sp>
+        <p:nvSpPr>
+          <p:cNvPr id="3" name="Inhaltsplatzhalter 2"/>
+          <p:cNvSpPr>
+            <a:spLocks noGrp="1"/>
+          </p:cNvSpPr>
+          <p:nvPr>
+            <p:ph idx="1"/>
+          </p:nvPr>
+        </p:nvSpPr>
+        <p:spPr/>
+        <p:txBody>
+          <a:bodyPr/>
+          <a:lstStyle/>
+          <a:p>
+            <a:r>
+              <a:rPr lang="de-CH" dirty="0" smtClean="0"/>
+              <a:t>Aufgrund unserer Evaluation entscheiden wir uns für </a:t>
+            </a:r>
+            <a:r>
+              <a:rPr lang="de-CH" dirty="0" smtClean="0"/>
+              <a:t>eine Mischform aus plangetriebener und agiler Arbeitsweise.</a:t>
+            </a:r>
+          </a:p>
+          <a:p>
+            <a:r>
+              <a:rPr lang="de-CH" dirty="0" smtClean="0"/>
+              <a:t>Plangetrieben ist der Prozessablauf von der Analyse über Entwicklung zur Einführung</a:t>
+            </a:r>
+            <a:endParaRPr lang="de-CH" dirty="0" smtClean="0"/>
+          </a:p>
+          <a:p>
+            <a:r>
+              <a:rPr lang="de-CH" dirty="0" smtClean="0"/>
+              <a:t>Agil ist die Entwicklungsphase </a:t>
+            </a:r>
+          </a:p>
+          <a:p>
+            <a:pPr marL="0" indent="0">
+              <a:buNone/>
+            </a:pPr>
+            <a:r>
+              <a:rPr lang="de-CH" dirty="0" smtClean="0"/>
+              <a:t>   (</a:t>
+            </a:r>
+            <a:r>
+              <a:rPr lang="de-CH" dirty="0" err="1" smtClean="0"/>
+              <a:t>Incermental</a:t>
+            </a:r>
+            <a:r>
+              <a:rPr lang="de-CH" dirty="0" smtClean="0"/>
+              <a:t> </a:t>
+            </a:r>
+            <a:r>
+              <a:rPr lang="de-CH" dirty="0" err="1" smtClean="0"/>
+              <a:t>Develeping</a:t>
+            </a:r>
+            <a:r>
+              <a:rPr lang="de-CH" dirty="0"/>
+              <a:t>)</a:t>
+            </a:r>
+            <a:endParaRPr lang="de-CH" dirty="0" smtClean="0"/>
+          </a:p>
+          <a:p>
+            <a:r>
+              <a:rPr lang="de-CH" dirty="0" smtClean="0"/>
+              <a:t>Verschiedene Versionen</a:t>
+            </a:r>
+            <a:br>
+              <a:rPr lang="de-CH" dirty="0" smtClean="0"/>
+            </a:br>
+            <a:r>
+              <a:rPr lang="de-CH" dirty="0" smtClean="0"/>
+              <a:t>der Software</a:t>
+            </a:r>
+          </a:p>
+          <a:p>
+            <a:endParaRPr lang="de-CH" dirty="0"/>
+          </a:p>
+          <a:p>
+            <a:pPr marL="0" indent="0">
+              <a:buNone/>
+            </a:pPr>
+            <a:endParaRPr lang="de-CH" dirty="0"/>
+          </a:p>
+        </p:txBody>
+      </p:sp>
     </p:spTree>
     <p:extLst>
       <p:ext uri="{BB962C8B-B14F-4D97-AF65-F5344CB8AC3E}">
@@ -4381,8 +4413,8 @@
         </p:nvGrpSpPr>
         <p:grpSpPr>
           <a:xfrm>
-            <a:off x="329784" y="2893102"/>
-            <a:ext cx="508414" cy="2863121"/>
+            <a:off x="329784" y="3495230"/>
+            <a:ext cx="508414" cy="2260993"/>
             <a:chOff x="329784" y="2893102"/>
             <a:chExt cx="508414" cy="2863121"/>
           </a:xfrm>
@@ -4504,6 +4536,697 @@
   <p:clrMapOvr>
     <a:masterClrMapping/>
   </p:clrMapOvr>
+  <p:timing>
+    <p:tnLst>
+      <p:par>
+        <p:cTn id="1" dur="indefinite" restart="never" nodeType="tmRoot"/>
+      </p:par>
+    </p:tnLst>
+  </p:timing>
+</p:sld>
+</file>
+
+<file path=ppt/slides/slide6.xml><?xml version="1.0" encoding="utf-8"?>
+<p:sld xmlns:a="http://schemas.openxmlformats.org/drawingml/2006/main" xmlns:r="http://schemas.openxmlformats.org/officeDocument/2006/relationships" xmlns:p="http://schemas.openxmlformats.org/presentationml/2006/main">
+  <p:cSld>
+    <p:spTree>
+      <p:nvGrpSpPr>
+        <p:cNvPr id="1" name=""/>
+        <p:cNvGrpSpPr/>
+        <p:nvPr/>
+      </p:nvGrpSpPr>
+      <p:grpSpPr>
+        <a:xfrm>
+          <a:off x="0" y="0"/>
+          <a:ext cx="0" cy="0"/>
+          <a:chOff x="0" y="0"/>
+          <a:chExt cx="0" cy="0"/>
+        </a:xfrm>
+      </p:grpSpPr>
+      <p:sp>
+        <p:nvSpPr>
+          <p:cNvPr id="2" name="Titel 1"/>
+          <p:cNvSpPr>
+            <a:spLocks noGrp="1"/>
+          </p:cNvSpPr>
+          <p:nvPr>
+            <p:ph type="title"/>
+          </p:nvPr>
+        </p:nvSpPr>
+        <p:spPr/>
+        <p:txBody>
+          <a:bodyPr/>
+          <a:lstStyle/>
+          <a:p>
+            <a:r>
+              <a:rPr lang="de-DE" dirty="0" smtClean="0"/>
+              <a:t>Unsere Projektplanung</a:t>
+            </a:r>
+            <a:endParaRPr lang="en-GB" dirty="0"/>
+          </a:p>
+        </p:txBody>
+      </p:sp>
+      <p:pic>
+        <p:nvPicPr>
+          <p:cNvPr id="1026" name="Picture 2"/>
+          <p:cNvPicPr>
+            <a:picLocks noGrp="1" noChangeAspect="1" noChangeArrowheads="1"/>
+          </p:cNvPicPr>
+          <p:nvPr>
+            <p:ph idx="1"/>
+          </p:nvPr>
+        </p:nvPicPr>
+        <p:blipFill>
+          <a:blip r:embed="rId2" cstate="print">
+            <a:extLst>
+              <a:ext uri="{28A0092B-C50C-407E-A947-70E740481C1C}">
+                <a14:useLocalDpi xmlns:a14="http://schemas.microsoft.com/office/drawing/2010/main" val="0"/>
+              </a:ext>
+            </a:extLst>
+          </a:blip>
+          <a:srcRect/>
+          <a:stretch>
+            <a:fillRect/>
+          </a:stretch>
+        </p:blipFill>
+        <p:spPr bwMode="auto">
+          <a:xfrm>
+            <a:off x="242284" y="2033899"/>
+            <a:ext cx="7691214" cy="4486542"/>
+          </a:xfrm>
+          <a:prstGeom prst="rect">
+            <a:avLst/>
+          </a:prstGeom>
+          <a:noFill/>
+          <a:ln>
+            <a:noFill/>
+          </a:ln>
+          <a:extLst>
+            <a:ext uri="{909E8E84-426E-40DD-AFC4-6F175D3DCCD1}">
+              <a14:hiddenFill xmlns:a14="http://schemas.microsoft.com/office/drawing/2010/main">
+                <a:solidFill>
+                  <a:schemeClr val="accent1"/>
+                </a:solidFill>
+              </a14:hiddenFill>
+            </a:ext>
+            <a:ext uri="{91240B29-F687-4F45-9708-019B960494DF}">
+              <a14:hiddenLine xmlns:a14="http://schemas.microsoft.com/office/drawing/2010/main" w="9525">
+                <a:solidFill>
+                  <a:schemeClr val="tx1"/>
+                </a:solidFill>
+                <a:miter lim="800000"/>
+                <a:headEnd/>
+                <a:tailEnd/>
+              </a14:hiddenLine>
+            </a:ext>
+          </a:extLst>
+        </p:spPr>
+      </p:pic>
+      <p:sp>
+        <p:nvSpPr>
+          <p:cNvPr id="4" name="Eine Ecke des Rechtecks abrunden 3"/>
+          <p:cNvSpPr/>
+          <p:nvPr/>
+        </p:nvSpPr>
+        <p:spPr>
+          <a:xfrm>
+            <a:off x="1187865" y="2666288"/>
+            <a:ext cx="5999147" cy="2939753"/>
+          </a:xfrm>
+          <a:prstGeom prst="round1Rect">
+            <a:avLst/>
+          </a:prstGeom>
+          <a:solidFill>
+            <a:schemeClr val="bg1">
+              <a:lumMod val="95000"/>
+            </a:schemeClr>
+          </a:solidFill>
+          <a:ln>
+            <a:solidFill>
+              <a:schemeClr val="bg1"/>
+            </a:solidFill>
+          </a:ln>
+        </p:spPr>
+        <p:style>
+          <a:lnRef idx="2">
+            <a:schemeClr val="accent1">
+              <a:shade val="50000"/>
+            </a:schemeClr>
+          </a:lnRef>
+          <a:fillRef idx="1">
+            <a:schemeClr val="accent1"/>
+          </a:fillRef>
+          <a:effectRef idx="0">
+            <a:schemeClr val="accent1"/>
+          </a:effectRef>
+          <a:fontRef idx="minor">
+            <a:schemeClr val="lt1"/>
+          </a:fontRef>
+        </p:style>
+        <p:txBody>
+          <a:bodyPr rtlCol="0" anchor="ctr"/>
+          <a:lstStyle/>
+          <a:p>
+            <a:pPr algn="ctr"/>
+            <a:endParaRPr lang="en-GB"/>
+          </a:p>
+        </p:txBody>
+      </p:sp>
+      <p:pic>
+        <p:nvPicPr>
+          <p:cNvPr id="1027" name="Picture 3"/>
+          <p:cNvPicPr>
+            <a:picLocks noChangeAspect="1" noChangeArrowheads="1"/>
+          </p:cNvPicPr>
+          <p:nvPr/>
+        </p:nvPicPr>
+        <p:blipFill>
+          <a:blip r:embed="rId3" cstate="print">
+            <a:extLst>
+              <a:ext uri="{28A0092B-C50C-407E-A947-70E740481C1C}">
+                <a14:useLocalDpi xmlns:a14="http://schemas.microsoft.com/office/drawing/2010/main" val="0"/>
+              </a:ext>
+            </a:extLst>
+          </a:blip>
+          <a:srcRect/>
+          <a:stretch>
+            <a:fillRect/>
+          </a:stretch>
+        </p:blipFill>
+        <p:spPr bwMode="auto">
+          <a:xfrm>
+            <a:off x="2559465" y="2127903"/>
+            <a:ext cx="4217965" cy="2360834"/>
+          </a:xfrm>
+          <a:prstGeom prst="rect">
+            <a:avLst/>
+          </a:prstGeom>
+          <a:noFill/>
+          <a:ln>
+            <a:noFill/>
+          </a:ln>
+          <a:extLst>
+            <a:ext uri="{909E8E84-426E-40DD-AFC4-6F175D3DCCD1}">
+              <a14:hiddenFill xmlns:a14="http://schemas.microsoft.com/office/drawing/2010/main">
+                <a:solidFill>
+                  <a:schemeClr val="accent1"/>
+                </a:solidFill>
+              </a14:hiddenFill>
+            </a:ext>
+            <a:ext uri="{91240B29-F687-4F45-9708-019B960494DF}">
+              <a14:hiddenLine xmlns:a14="http://schemas.microsoft.com/office/drawing/2010/main" w="9525">
+                <a:solidFill>
+                  <a:schemeClr val="tx1"/>
+                </a:solidFill>
+                <a:miter lim="800000"/>
+                <a:headEnd/>
+                <a:tailEnd/>
+              </a14:hiddenLine>
+            </a:ext>
+          </a:extLst>
+        </p:spPr>
+      </p:pic>
+      <p:cxnSp>
+        <p:nvCxnSpPr>
+          <p:cNvPr id="9" name="Gerade Verbindung mit Pfeil 8"/>
+          <p:cNvCxnSpPr/>
+          <p:nvPr/>
+        </p:nvCxnSpPr>
+        <p:spPr>
+          <a:xfrm>
+            <a:off x="1991170" y="2580830"/>
+            <a:ext cx="495656" cy="727490"/>
+          </a:xfrm>
+          <a:prstGeom prst="straightConnector1">
+            <a:avLst/>
+          </a:prstGeom>
+          <a:ln w="12700">
+            <a:solidFill>
+              <a:schemeClr val="tx1"/>
+            </a:solidFill>
+            <a:tailEnd type="arrow"/>
+          </a:ln>
+        </p:spPr>
+        <p:style>
+          <a:lnRef idx="1">
+            <a:schemeClr val="accent1"/>
+          </a:lnRef>
+          <a:fillRef idx="0">
+            <a:schemeClr val="accent1"/>
+          </a:fillRef>
+          <a:effectRef idx="0">
+            <a:schemeClr val="accent1"/>
+          </a:effectRef>
+          <a:fontRef idx="minor">
+            <a:schemeClr val="tx1"/>
+          </a:fontRef>
+        </p:style>
+      </p:cxnSp>
+      <p:cxnSp>
+        <p:nvCxnSpPr>
+          <p:cNvPr id="12" name="Gerade Verbindung mit Pfeil 11"/>
+          <p:cNvCxnSpPr/>
+          <p:nvPr/>
+        </p:nvCxnSpPr>
+        <p:spPr>
+          <a:xfrm>
+            <a:off x="6264067" y="4589092"/>
+            <a:ext cx="350993" cy="887303"/>
+          </a:xfrm>
+          <a:prstGeom prst="straightConnector1">
+            <a:avLst/>
+          </a:prstGeom>
+          <a:ln w="12700">
+            <a:solidFill>
+              <a:schemeClr val="tx1"/>
+            </a:solidFill>
+            <a:tailEnd type="arrow"/>
+          </a:ln>
+        </p:spPr>
+        <p:style>
+          <a:lnRef idx="1">
+            <a:schemeClr val="accent1"/>
+          </a:lnRef>
+          <a:fillRef idx="0">
+            <a:schemeClr val="accent1"/>
+          </a:fillRef>
+          <a:effectRef idx="0">
+            <a:schemeClr val="accent1"/>
+          </a:effectRef>
+          <a:fontRef idx="minor">
+            <a:schemeClr val="tx1"/>
+          </a:fontRef>
+        </p:style>
+      </p:cxnSp>
+      <p:sp>
+        <p:nvSpPr>
+          <p:cNvPr id="16" name="Textfeld 15"/>
+          <p:cNvSpPr txBox="1"/>
+          <p:nvPr/>
+        </p:nvSpPr>
+        <p:spPr>
+          <a:xfrm>
+            <a:off x="7657031" y="1759761"/>
+            <a:ext cx="3800720" cy="923330"/>
+          </a:xfrm>
+          <a:prstGeom prst="rect">
+            <a:avLst/>
+          </a:prstGeom>
+          <a:noFill/>
+        </p:spPr>
+        <p:txBody>
+          <a:bodyPr wrap="none" rtlCol="0">
+            <a:spAutoFit/>
+          </a:bodyPr>
+          <a:lstStyle/>
+          <a:p>
+            <a:r>
+              <a:rPr lang="de-DE" dirty="0" smtClean="0"/>
+              <a:t>-Gesamtgrobplanung ist plangetrieben</a:t>
+            </a:r>
+          </a:p>
+          <a:p>
+            <a:endParaRPr lang="de-DE" dirty="0" smtClean="0"/>
+          </a:p>
+          <a:p>
+            <a:r>
+              <a:rPr lang="de-DE" dirty="0" smtClean="0"/>
+              <a:t>-Entwicklungsphase ist agil</a:t>
+            </a:r>
+            <a:endParaRPr lang="en-GB" dirty="0"/>
+          </a:p>
+        </p:txBody>
+      </p:sp>
+    </p:spTree>
+    <p:extLst>
+      <p:ext uri="{BB962C8B-B14F-4D97-AF65-F5344CB8AC3E}">
+        <p14:creationId xmlns:p14="http://schemas.microsoft.com/office/powerpoint/2010/main" val="731336380"/>
+      </p:ext>
+    </p:extLst>
+  </p:cSld>
+  <p:clrMapOvr>
+    <a:masterClrMapping/>
+  </p:clrMapOvr>
+  <p:timing>
+    <p:tnLst>
+      <p:par>
+        <p:cTn id="1" dur="indefinite" restart="never" nodeType="tmRoot">
+          <p:childTnLst>
+            <p:seq concurrent="1" nextAc="seek">
+              <p:cTn id="2" dur="indefinite" nodeType="mainSeq">
+                <p:childTnLst>
+                  <p:par>
+                    <p:cTn id="3" fill="hold">
+                      <p:stCondLst>
+                        <p:cond delay="indefinite"/>
+                      </p:stCondLst>
+                      <p:childTnLst>
+                        <p:par>
+                          <p:cTn id="4" fill="hold">
+                            <p:stCondLst>
+                              <p:cond delay="0"/>
+                            </p:stCondLst>
+                            <p:childTnLst>
+                              <p:par>
+                                <p:cTn id="5" presetID="1" presetClass="entr" presetSubtype="0" fill="hold" nodeType="clickEffect">
+                                  <p:stCondLst>
+                                    <p:cond delay="0"/>
+                                  </p:stCondLst>
+                                  <p:childTnLst>
+                                    <p:set>
+                                      <p:cBhvr>
+                                        <p:cTn id="6" dur="1" fill="hold">
+                                          <p:stCondLst>
+                                            <p:cond delay="0"/>
+                                          </p:stCondLst>
+                                        </p:cTn>
+                                        <p:tgtEl>
+                                          <p:spTgt spid="1026"/>
+                                        </p:tgtEl>
+                                        <p:attrNameLst>
+                                          <p:attrName>style.visibility</p:attrName>
+                                        </p:attrNameLst>
+                                      </p:cBhvr>
+                                      <p:to>
+                                        <p:strVal val="visible"/>
+                                      </p:to>
+                                    </p:set>
+                                  </p:childTnLst>
+                                </p:cTn>
+                              </p:par>
+                            </p:childTnLst>
+                          </p:cTn>
+                        </p:par>
+                      </p:childTnLst>
+                    </p:cTn>
+                  </p:par>
+                  <p:par>
+                    <p:cTn id="7" fill="hold">
+                      <p:stCondLst>
+                        <p:cond delay="indefinite"/>
+                      </p:stCondLst>
+                      <p:childTnLst>
+                        <p:par>
+                          <p:cTn id="8" fill="hold">
+                            <p:stCondLst>
+                              <p:cond delay="0"/>
+                            </p:stCondLst>
+                            <p:childTnLst>
+                              <p:par>
+                                <p:cTn id="9" presetID="1" presetClass="entr" presetSubtype="0" fill="hold" grpId="0" nodeType="clickEffect">
+                                  <p:stCondLst>
+                                    <p:cond delay="0"/>
+                                  </p:stCondLst>
+                                  <p:childTnLst>
+                                    <p:set>
+                                      <p:cBhvr>
+                                        <p:cTn id="10" dur="1" fill="hold">
+                                          <p:stCondLst>
+                                            <p:cond delay="0"/>
+                                          </p:stCondLst>
+                                        </p:cTn>
+                                        <p:tgtEl>
+                                          <p:spTgt spid="4"/>
+                                        </p:tgtEl>
+                                        <p:attrNameLst>
+                                          <p:attrName>style.visibility</p:attrName>
+                                        </p:attrNameLst>
+                                      </p:cBhvr>
+                                      <p:to>
+                                        <p:strVal val="visible"/>
+                                      </p:to>
+                                    </p:set>
+                                  </p:childTnLst>
+                                </p:cTn>
+                              </p:par>
+                            </p:childTnLst>
+                          </p:cTn>
+                        </p:par>
+                      </p:childTnLst>
+                    </p:cTn>
+                  </p:par>
+                  <p:par>
+                    <p:cTn id="11" fill="hold">
+                      <p:stCondLst>
+                        <p:cond delay="indefinite"/>
+                      </p:stCondLst>
+                      <p:childTnLst>
+                        <p:par>
+                          <p:cTn id="12" fill="hold">
+                            <p:stCondLst>
+                              <p:cond delay="0"/>
+                            </p:stCondLst>
+                            <p:childTnLst>
+                              <p:par>
+                                <p:cTn id="13" presetID="2" presetClass="entr" presetSubtype="4" fill="hold" nodeType="clickEffect">
+                                  <p:stCondLst>
+                                    <p:cond delay="0"/>
+                                  </p:stCondLst>
+                                  <p:childTnLst>
+                                    <p:set>
+                                      <p:cBhvr>
+                                        <p:cTn id="14" dur="1" fill="hold">
+                                          <p:stCondLst>
+                                            <p:cond delay="0"/>
+                                          </p:stCondLst>
+                                        </p:cTn>
+                                        <p:tgtEl>
+                                          <p:spTgt spid="1027"/>
+                                        </p:tgtEl>
+                                        <p:attrNameLst>
+                                          <p:attrName>style.visibility</p:attrName>
+                                        </p:attrNameLst>
+                                      </p:cBhvr>
+                                      <p:to>
+                                        <p:strVal val="visible"/>
+                                      </p:to>
+                                    </p:set>
+                                    <p:anim calcmode="lin" valueType="num">
+                                      <p:cBhvr additive="base">
+                                        <p:cTn id="15" dur="500" fill="hold"/>
+                                        <p:tgtEl>
+                                          <p:spTgt spid="1027"/>
+                                        </p:tgtEl>
+                                        <p:attrNameLst>
+                                          <p:attrName>ppt_x</p:attrName>
+                                        </p:attrNameLst>
+                                      </p:cBhvr>
+                                      <p:tavLst>
+                                        <p:tav tm="0">
+                                          <p:val>
+                                            <p:strVal val="#ppt_x"/>
+                                          </p:val>
+                                        </p:tav>
+                                        <p:tav tm="100000">
+                                          <p:val>
+                                            <p:strVal val="#ppt_x"/>
+                                          </p:val>
+                                        </p:tav>
+                                      </p:tavLst>
+                                    </p:anim>
+                                    <p:anim calcmode="lin" valueType="num">
+                                      <p:cBhvr additive="base">
+                                        <p:cTn id="16" dur="500" fill="hold"/>
+                                        <p:tgtEl>
+                                          <p:spTgt spid="1027"/>
+                                        </p:tgtEl>
+                                        <p:attrNameLst>
+                                          <p:attrName>ppt_y</p:attrName>
+                                        </p:attrNameLst>
+                                      </p:cBhvr>
+                                      <p:tavLst>
+                                        <p:tav tm="0">
+                                          <p:val>
+                                            <p:strVal val="1+#ppt_h/2"/>
+                                          </p:val>
+                                        </p:tav>
+                                        <p:tav tm="100000">
+                                          <p:val>
+                                            <p:strVal val="#ppt_y"/>
+                                          </p:val>
+                                        </p:tav>
+                                      </p:tavLst>
+                                    </p:anim>
+                                  </p:childTnLst>
+                                </p:cTn>
+                              </p:par>
+                              <p:par>
+                                <p:cTn id="17" presetID="2" presetClass="entr" presetSubtype="4" fill="hold" nodeType="withEffect">
+                                  <p:stCondLst>
+                                    <p:cond delay="0"/>
+                                  </p:stCondLst>
+                                  <p:childTnLst>
+                                    <p:set>
+                                      <p:cBhvr>
+                                        <p:cTn id="18" dur="1" fill="hold">
+                                          <p:stCondLst>
+                                            <p:cond delay="0"/>
+                                          </p:stCondLst>
+                                        </p:cTn>
+                                        <p:tgtEl>
+                                          <p:spTgt spid="9"/>
+                                        </p:tgtEl>
+                                        <p:attrNameLst>
+                                          <p:attrName>style.visibility</p:attrName>
+                                        </p:attrNameLst>
+                                      </p:cBhvr>
+                                      <p:to>
+                                        <p:strVal val="visible"/>
+                                      </p:to>
+                                    </p:set>
+                                    <p:anim calcmode="lin" valueType="num">
+                                      <p:cBhvr additive="base">
+                                        <p:cTn id="19" dur="500" fill="hold"/>
+                                        <p:tgtEl>
+                                          <p:spTgt spid="9"/>
+                                        </p:tgtEl>
+                                        <p:attrNameLst>
+                                          <p:attrName>ppt_x</p:attrName>
+                                        </p:attrNameLst>
+                                      </p:cBhvr>
+                                      <p:tavLst>
+                                        <p:tav tm="0">
+                                          <p:val>
+                                            <p:strVal val="#ppt_x"/>
+                                          </p:val>
+                                        </p:tav>
+                                        <p:tav tm="100000">
+                                          <p:val>
+                                            <p:strVal val="#ppt_x"/>
+                                          </p:val>
+                                        </p:tav>
+                                      </p:tavLst>
+                                    </p:anim>
+                                    <p:anim calcmode="lin" valueType="num">
+                                      <p:cBhvr additive="base">
+                                        <p:cTn id="20" dur="500" fill="hold"/>
+                                        <p:tgtEl>
+                                          <p:spTgt spid="9"/>
+                                        </p:tgtEl>
+                                        <p:attrNameLst>
+                                          <p:attrName>ppt_y</p:attrName>
+                                        </p:attrNameLst>
+                                      </p:cBhvr>
+                                      <p:tavLst>
+                                        <p:tav tm="0">
+                                          <p:val>
+                                            <p:strVal val="1+#ppt_h/2"/>
+                                          </p:val>
+                                        </p:tav>
+                                        <p:tav tm="100000">
+                                          <p:val>
+                                            <p:strVal val="#ppt_y"/>
+                                          </p:val>
+                                        </p:tav>
+                                      </p:tavLst>
+                                    </p:anim>
+                                  </p:childTnLst>
+                                </p:cTn>
+                              </p:par>
+                              <p:par>
+                                <p:cTn id="21" presetID="2" presetClass="entr" presetSubtype="4" fill="hold" nodeType="withEffect">
+                                  <p:stCondLst>
+                                    <p:cond delay="0"/>
+                                  </p:stCondLst>
+                                  <p:childTnLst>
+                                    <p:set>
+                                      <p:cBhvr>
+                                        <p:cTn id="22" dur="1" fill="hold">
+                                          <p:stCondLst>
+                                            <p:cond delay="0"/>
+                                          </p:stCondLst>
+                                        </p:cTn>
+                                        <p:tgtEl>
+                                          <p:spTgt spid="12"/>
+                                        </p:tgtEl>
+                                        <p:attrNameLst>
+                                          <p:attrName>style.visibility</p:attrName>
+                                        </p:attrNameLst>
+                                      </p:cBhvr>
+                                      <p:to>
+                                        <p:strVal val="visible"/>
+                                      </p:to>
+                                    </p:set>
+                                    <p:anim calcmode="lin" valueType="num">
+                                      <p:cBhvr additive="base">
+                                        <p:cTn id="23" dur="500" fill="hold"/>
+                                        <p:tgtEl>
+                                          <p:spTgt spid="12"/>
+                                        </p:tgtEl>
+                                        <p:attrNameLst>
+                                          <p:attrName>ppt_x</p:attrName>
+                                        </p:attrNameLst>
+                                      </p:cBhvr>
+                                      <p:tavLst>
+                                        <p:tav tm="0">
+                                          <p:val>
+                                            <p:strVal val="#ppt_x"/>
+                                          </p:val>
+                                        </p:tav>
+                                        <p:tav tm="100000">
+                                          <p:val>
+                                            <p:strVal val="#ppt_x"/>
+                                          </p:val>
+                                        </p:tav>
+                                      </p:tavLst>
+                                    </p:anim>
+                                    <p:anim calcmode="lin" valueType="num">
+                                      <p:cBhvr additive="base">
+                                        <p:cTn id="24" dur="500" fill="hold"/>
+                                        <p:tgtEl>
+                                          <p:spTgt spid="12"/>
+                                        </p:tgtEl>
+                                        <p:attrNameLst>
+                                          <p:attrName>ppt_y</p:attrName>
+                                        </p:attrNameLst>
+                                      </p:cBhvr>
+                                      <p:tavLst>
+                                        <p:tav tm="0">
+                                          <p:val>
+                                            <p:strVal val="1+#ppt_h/2"/>
+                                          </p:val>
+                                        </p:tav>
+                                        <p:tav tm="100000">
+                                          <p:val>
+                                            <p:strVal val="#ppt_y"/>
+                                          </p:val>
+                                        </p:tav>
+                                      </p:tavLst>
+                                    </p:anim>
+                                  </p:childTnLst>
+                                </p:cTn>
+                              </p:par>
+                            </p:childTnLst>
+                          </p:cTn>
+                        </p:par>
+                      </p:childTnLst>
+                    </p:cTn>
+                  </p:par>
+                </p:childTnLst>
+              </p:cTn>
+              <p:prevCondLst>
+                <p:cond evt="onPrev" delay="0">
+                  <p:tgtEl>
+                    <p:sldTgt/>
+                  </p:tgtEl>
+                </p:cond>
+              </p:prevCondLst>
+              <p:nextCondLst>
+                <p:cond evt="onNext" delay="0">
+                  <p:tgtEl>
+                    <p:sldTgt/>
+                  </p:tgtEl>
+                </p:cond>
+              </p:nextCondLst>
+            </p:seq>
+          </p:childTnLst>
+        </p:cTn>
+      </p:par>
+    </p:tnLst>
+    <p:bldLst>
+      <p:bldP spid="4" grpId="0" animBg="1"/>
+    </p:bldLst>
+  </p:timing>
 </p:sld>
 </file>
 
@@ -4762,7 +5485,7 @@
   <a:extraClrSchemeLst/>
   <a:extLst>
     <a:ext uri="{05A4C25C-085E-4340-85A3-A5531E510DB2}">
-      <thm15:themeFamily xmlns:thm15="http://schemas.microsoft.com/office/thememl/2012/main" name="Office Theme" id="{62F939B6-93AF-4DB8-9C6B-D6C7DFDC589F}" vid="{4A3C46E8-61CC-4603-A589-7422A47A8E4A}"/>
+      <thm15:themeFamily xmlns:thm15="http://schemas.microsoft.com/office/thememl/2012/main" xmlns="" name="Office Theme" id="{62F939B6-93AF-4DB8-9C6B-D6C7DFDC589F}" vid="{4A3C46E8-61CC-4603-A589-7422A47A8E4A}"/>
     </a:ext>
   </a:extLst>
 </a:theme>

</xml_diff>